<commit_message>
Updated week 4 slides
</commit_message>
<xml_diff>
--- a/Lectures/week_4/CSE 599V Lecture 9 - Estimating Confidence in Models and Parameters- I .pptx
+++ b/Lectures/week_4/CSE 599V Lecture 9 - Estimating Confidence in Models and Parameters- I .pptx
@@ -5,32 +5,31 @@
     <p:sldMasterId id="2147483648" r:id="rId1"/>
   </p:sldMasterIdLst>
   <p:notesMasterIdLst>
-    <p:notesMasterId r:id="rId22"/>
+    <p:notesMasterId r:id="rId21"/>
   </p:notesMasterIdLst>
   <p:handoutMasterIdLst>
-    <p:handoutMasterId r:id="rId23"/>
+    <p:handoutMasterId r:id="rId22"/>
   </p:handoutMasterIdLst>
   <p:sldIdLst>
     <p:sldId id="347" r:id="rId2"/>
     <p:sldId id="371" r:id="rId3"/>
-    <p:sldId id="348" r:id="rId4"/>
-    <p:sldId id="349" r:id="rId5"/>
-    <p:sldId id="352" r:id="rId6"/>
-    <p:sldId id="351" r:id="rId7"/>
-    <p:sldId id="353" r:id="rId8"/>
-    <p:sldId id="356" r:id="rId9"/>
-    <p:sldId id="354" r:id="rId10"/>
-    <p:sldId id="364" r:id="rId11"/>
-    <p:sldId id="355" r:id="rId12"/>
-    <p:sldId id="365" r:id="rId13"/>
-    <p:sldId id="369" r:id="rId14"/>
-    <p:sldId id="368" r:id="rId15"/>
-    <p:sldId id="366" r:id="rId16"/>
-    <p:sldId id="370" r:id="rId17"/>
-    <p:sldId id="361" r:id="rId18"/>
-    <p:sldId id="362" r:id="rId19"/>
-    <p:sldId id="357" r:id="rId20"/>
-    <p:sldId id="358" r:id="rId21"/>
+    <p:sldId id="349" r:id="rId4"/>
+    <p:sldId id="352" r:id="rId5"/>
+    <p:sldId id="351" r:id="rId6"/>
+    <p:sldId id="353" r:id="rId7"/>
+    <p:sldId id="356" r:id="rId8"/>
+    <p:sldId id="354" r:id="rId9"/>
+    <p:sldId id="364" r:id="rId10"/>
+    <p:sldId id="355" r:id="rId11"/>
+    <p:sldId id="365" r:id="rId12"/>
+    <p:sldId id="369" r:id="rId13"/>
+    <p:sldId id="368" r:id="rId14"/>
+    <p:sldId id="366" r:id="rId15"/>
+    <p:sldId id="370" r:id="rId16"/>
+    <p:sldId id="361" r:id="rId17"/>
+    <p:sldId id="362" r:id="rId18"/>
+    <p:sldId id="357" r:id="rId19"/>
+    <p:sldId id="358" r:id="rId20"/>
   </p:sldIdLst>
   <p:sldSz cx="9144000" cy="6858000" type="screen4x3"/>
   <p:notesSz cx="6858000" cy="9144000"/>
@@ -5071,7 +5070,7 @@
               <a:rPr lang="en-US" altLang="en-US" sz="2800" b="1" u="sng" dirty="0">
                 <a:ea typeface="ＭＳ Ｐゴシック" panose="020B0600070205080204" pitchFamily="34" charset="-128"/>
               </a:rPr>
-              <a:t>Lecture 9: Estimating Confidence in Models and Parameters</a:t>
+              <a:t>Lecture 9: Estimating Confidence in Models and Parameters: I</a:t>
             </a:r>
             <a:br>
               <a:rPr lang="en-US" altLang="en-US" b="1" dirty="0">
@@ -5186,1434 +5185,6 @@
 </file>
 
 <file path=ppt/slides/slide10.xml><?xml version="1.0" encoding="utf-8"?>
-<p:sld xmlns:a="http://schemas.openxmlformats.org/drawingml/2006/main" xmlns:r="http://schemas.openxmlformats.org/officeDocument/2006/relationships" xmlns:p="http://schemas.openxmlformats.org/presentationml/2006/main">
-  <p:cSld>
-    <p:spTree>
-      <p:nvGrpSpPr>
-        <p:cNvPr id="1" name=""/>
-        <p:cNvGrpSpPr/>
-        <p:nvPr/>
-      </p:nvGrpSpPr>
-      <p:grpSpPr>
-        <a:xfrm>
-          <a:off x="0" y="0"/>
-          <a:ext cx="0" cy="0"/>
-          <a:chOff x="0" y="0"/>
-          <a:chExt cx="0" cy="0"/>
-        </a:xfrm>
-      </p:grpSpPr>
-      <mc:AlternateContent xmlns:mc="http://schemas.openxmlformats.org/markup-compatibility/2006">
-        <mc:Choice xmlns:a14="http://schemas.microsoft.com/office/drawing/2010/main" Requires="a14">
-          <p:sp>
-            <p:nvSpPr>
-              <p:cNvPr id="2" name="Title 1">
-                <a:extLst>
-                  <a:ext uri="{FF2B5EF4-FFF2-40B4-BE49-F238E27FC236}">
-                    <a16:creationId xmlns:a16="http://schemas.microsoft.com/office/drawing/2014/main" id="{8F25CC62-9A33-B347-96DA-4ACFB99F45D7}"/>
-                  </a:ext>
-                </a:extLst>
-              </p:cNvPr>
-              <p:cNvSpPr>
-                <a:spLocks noGrp="1"/>
-              </p:cNvSpPr>
-              <p:nvPr>
-                <p:ph type="title"/>
-              </p:nvPr>
-            </p:nvSpPr>
-            <p:spPr/>
-            <p:txBody>
-              <a:bodyPr/>
-              <a:lstStyle/>
-              <a:p>
-                <a:r>
-                  <a:rPr lang="en-US" dirty="0"/>
-                  <a:t>Quantifying Model Quality: </a:t>
-                </a:r>
-                <a14:m>
-                  <m:oMath xmlns:m="http://schemas.openxmlformats.org/officeDocument/2006/math">
-                    <m:sSup>
-                      <m:sSupPr>
-                        <m:ctrlPr>
-                          <a:rPr lang="en-US" b="1" i="1" smtClean="0">
-                            <a:latin typeface="Cambria Math" panose="02040503050406030204" pitchFamily="18" charset="0"/>
-                          </a:rPr>
-                        </m:ctrlPr>
-                      </m:sSupPr>
-                      <m:e>
-                        <m:r>
-                          <a:rPr lang="en-US" b="1" i="1" smtClean="0">
-                            <a:latin typeface="Cambria Math" panose="02040503050406030204" pitchFamily="18" charset="0"/>
-                          </a:rPr>
-                          <m:t>𝑹</m:t>
-                        </m:r>
-                      </m:e>
-                      <m:sup>
-                        <m:r>
-                          <a:rPr lang="en-US" b="1" i="1" smtClean="0">
-                            <a:latin typeface="Cambria Math" panose="02040503050406030204" pitchFamily="18" charset="0"/>
-                          </a:rPr>
-                          <m:t>𝟐</m:t>
-                        </m:r>
-                      </m:sup>
-                    </m:sSup>
-                  </m:oMath>
-                </a14:m>
-                <a:endParaRPr lang="en-US" dirty="0"/>
-              </a:p>
-            </p:txBody>
-          </p:sp>
-        </mc:Choice>
-        <mc:Fallback>
-          <p:sp>
-            <p:nvSpPr>
-              <p:cNvPr id="2" name="Title 1">
-                <a:extLst>
-                  <a:ext uri="{FF2B5EF4-FFF2-40B4-BE49-F238E27FC236}">
-                    <a16:creationId xmlns:a16="http://schemas.microsoft.com/office/drawing/2014/main" id="{8F25CC62-9A33-B347-96DA-4ACFB99F45D7}"/>
-                  </a:ext>
-                </a:extLst>
-              </p:cNvPr>
-              <p:cNvSpPr>
-                <a:spLocks noGrp="1" noRot="1" noChangeAspect="1" noMove="1" noResize="1" noEditPoints="1" noAdjustHandles="1" noChangeArrowheads="1" noChangeShapeType="1" noTextEdit="1"/>
-              </p:cNvSpPr>
-              <p:nvPr>
-                <p:ph type="title"/>
-              </p:nvPr>
-            </p:nvSpPr>
-            <p:spPr>
-              <a:blipFill>
-                <a:blip r:embed="rId2"/>
-                <a:stretch>
-                  <a:fillRect t="-8955" b="-5970"/>
-                </a:stretch>
-              </a:blipFill>
-            </p:spPr>
-            <p:txBody>
-              <a:bodyPr/>
-              <a:lstStyle/>
-              <a:p>
-                <a:r>
-                  <a:rPr lang="en-US">
-                    <a:noFill/>
-                  </a:rPr>
-                  <a:t> </a:t>
-                </a:r>
-              </a:p>
-            </p:txBody>
-          </p:sp>
-        </mc:Fallback>
-      </mc:AlternateContent>
-      <p:sp>
-        <p:nvSpPr>
-          <p:cNvPr id="3" name="Slide Number Placeholder 2">
-            <a:extLst>
-              <a:ext uri="{FF2B5EF4-FFF2-40B4-BE49-F238E27FC236}">
-                <a16:creationId xmlns:a16="http://schemas.microsoft.com/office/drawing/2014/main" id="{A669C8F2-1590-6F45-9CB2-1572F3279198}"/>
-              </a:ext>
-            </a:extLst>
-          </p:cNvPr>
-          <p:cNvSpPr>
-            <a:spLocks noGrp="1"/>
-          </p:cNvSpPr>
-          <p:nvPr>
-            <p:ph type="sldNum" sz="quarter" idx="11"/>
-          </p:nvPr>
-        </p:nvSpPr>
-        <p:spPr/>
-        <p:txBody>
-          <a:bodyPr/>
-          <a:lstStyle/>
-          <a:p>
-            <a:pPr>
-              <a:defRPr/>
-            </a:pPr>
-            <a:fld id="{2E4304A7-0FB2-4094-BC1E-DB17183AD0C1}" type="slidenum">
-              <a:rPr lang="en-US" altLang="x-none" smtClean="0"/>
-              <a:pPr>
-                <a:defRPr/>
-              </a:pPr>
-              <a:t>10</a:t>
-            </a:fld>
-            <a:endParaRPr lang="en-US" altLang="x-none"/>
-          </a:p>
-        </p:txBody>
-      </p:sp>
-      <p:pic>
-        <p:nvPicPr>
-          <p:cNvPr id="4" name="Picture 3">
-            <a:extLst>
-              <a:ext uri="{FF2B5EF4-FFF2-40B4-BE49-F238E27FC236}">
-                <a16:creationId xmlns:a16="http://schemas.microsoft.com/office/drawing/2014/main" id="{C7D92168-3C78-5E43-9449-B628AADE85CF}"/>
-              </a:ext>
-            </a:extLst>
-          </p:cNvPr>
-          <p:cNvPicPr>
-            <a:picLocks noChangeAspect="1"/>
-          </p:cNvPicPr>
-          <p:nvPr/>
-        </p:nvPicPr>
-        <p:blipFill>
-          <a:blip r:embed="rId3"/>
-          <a:stretch>
-            <a:fillRect/>
-          </a:stretch>
-        </p:blipFill>
-        <p:spPr>
-          <a:xfrm>
-            <a:off x="1527811" y="2239758"/>
-            <a:ext cx="2743200" cy="1904104"/>
-          </a:xfrm>
-          <a:prstGeom prst="rect">
-            <a:avLst/>
-          </a:prstGeom>
-        </p:spPr>
-      </p:pic>
-      <p:pic>
-        <p:nvPicPr>
-          <p:cNvPr id="5" name="Picture 4">
-            <a:extLst>
-              <a:ext uri="{FF2B5EF4-FFF2-40B4-BE49-F238E27FC236}">
-                <a16:creationId xmlns:a16="http://schemas.microsoft.com/office/drawing/2014/main" id="{47926247-FAA6-8C4B-B960-C11A5BC1B228}"/>
-              </a:ext>
-            </a:extLst>
-          </p:cNvPr>
-          <p:cNvPicPr>
-            <a:picLocks noChangeAspect="1"/>
-          </p:cNvPicPr>
-          <p:nvPr/>
-        </p:nvPicPr>
-        <p:blipFill>
-          <a:blip r:embed="rId4"/>
-          <a:stretch>
-            <a:fillRect/>
-          </a:stretch>
-        </p:blipFill>
-        <p:spPr>
-          <a:xfrm>
-            <a:off x="4575811" y="2254532"/>
-            <a:ext cx="2745499" cy="1860268"/>
-          </a:xfrm>
-          <a:prstGeom prst="rect">
-            <a:avLst/>
-          </a:prstGeom>
-        </p:spPr>
-      </p:pic>
-      <mc:AlternateContent xmlns:mc="http://schemas.openxmlformats.org/markup-compatibility/2006">
-        <mc:Choice xmlns:a14="http://schemas.microsoft.com/office/drawing/2010/main" Requires="a14">
-          <p:sp>
-            <p:nvSpPr>
-              <p:cNvPr id="6" name="TextBox 5">
-                <a:extLst>
-                  <a:ext uri="{FF2B5EF4-FFF2-40B4-BE49-F238E27FC236}">
-                    <a16:creationId xmlns:a16="http://schemas.microsoft.com/office/drawing/2014/main" id="{191DB443-7981-CB40-871D-3875693439E0}"/>
-                  </a:ext>
-                </a:extLst>
-              </p:cNvPr>
-              <p:cNvSpPr txBox="1"/>
-              <p:nvPr/>
-            </p:nvSpPr>
-            <p:spPr>
-              <a:xfrm>
-                <a:off x="1985011" y="1905000"/>
-                <a:ext cx="1163780" cy="276999"/>
-              </a:xfrm>
-              <a:prstGeom prst="rect">
-                <a:avLst/>
-              </a:prstGeom>
-              <a:noFill/>
-            </p:spPr>
-            <p:txBody>
-              <a:bodyPr wrap="none" lIns="0" tIns="0" rIns="0" bIns="0" rtlCol="0">
-                <a:spAutoFit/>
-              </a:bodyPr>
-              <a:lstStyle/>
-              <a:p>
-                <a:pPr/>
-                <a14:m>
-                  <m:oMathPara xmlns:m="http://schemas.openxmlformats.org/officeDocument/2006/math">
-                    <m:oMathParaPr>
-                      <m:jc m:val="centerGroup"/>
-                    </m:oMathParaPr>
-                    <m:oMath xmlns:m="http://schemas.openxmlformats.org/officeDocument/2006/math">
-                      <m:r>
-                        <a:rPr lang="en-US" b="0" i="1" smtClean="0">
-                          <a:latin typeface="Cambria Math" panose="02040503050406030204" pitchFamily="18" charset="0"/>
-                        </a:rPr>
-                        <m:t>𝑦</m:t>
-                      </m:r>
-                      <m:r>
-                        <a:rPr lang="en-US" b="0" i="1" smtClean="0">
-                          <a:latin typeface="Cambria Math" panose="02040503050406030204" pitchFamily="18" charset="0"/>
-                        </a:rPr>
-                        <m:t>=</m:t>
-                      </m:r>
-                      <m:r>
-                        <a:rPr lang="en-US" b="0" i="1" smtClean="0">
-                          <a:latin typeface="Cambria Math" panose="02040503050406030204" pitchFamily="18" charset="0"/>
-                        </a:rPr>
-                        <m:t>𝑎𝑥</m:t>
-                      </m:r>
-                      <m:r>
-                        <a:rPr lang="en-US" b="0" i="1" smtClean="0">
-                          <a:latin typeface="Cambria Math" panose="02040503050406030204" pitchFamily="18" charset="0"/>
-                        </a:rPr>
-                        <m:t>+</m:t>
-                      </m:r>
-                      <m:r>
-                        <a:rPr lang="en-US" b="0" i="1" smtClean="0">
-                          <a:latin typeface="Cambria Math" panose="02040503050406030204" pitchFamily="18" charset="0"/>
-                        </a:rPr>
-                        <m:t>𝑏</m:t>
-                      </m:r>
-                    </m:oMath>
-                  </m:oMathPara>
-                </a14:m>
-                <a:endParaRPr lang="en-US" dirty="0"/>
-              </a:p>
-            </p:txBody>
-          </p:sp>
-        </mc:Choice>
-        <mc:Fallback>
-          <p:sp>
-            <p:nvSpPr>
-              <p:cNvPr id="6" name="TextBox 5">
-                <a:extLst>
-                  <a:ext uri="{FF2B5EF4-FFF2-40B4-BE49-F238E27FC236}">
-                    <a16:creationId xmlns:a16="http://schemas.microsoft.com/office/drawing/2014/main" id="{191DB443-7981-CB40-871D-3875693439E0}"/>
-                  </a:ext>
-                </a:extLst>
-              </p:cNvPr>
-              <p:cNvSpPr txBox="1">
-                <a:spLocks noRot="1" noChangeAspect="1" noMove="1" noResize="1" noEditPoints="1" noAdjustHandles="1" noChangeArrowheads="1" noChangeShapeType="1" noTextEdit="1"/>
-              </p:cNvSpPr>
-              <p:nvPr/>
-            </p:nvSpPr>
-            <p:spPr>
-              <a:xfrm>
-                <a:off x="1985011" y="1905000"/>
-                <a:ext cx="1163780" cy="276999"/>
-              </a:xfrm>
-              <a:prstGeom prst="rect">
-                <a:avLst/>
-              </a:prstGeom>
-              <a:blipFill>
-                <a:blip r:embed="rId5"/>
-                <a:stretch>
-                  <a:fillRect l="-4348" r="-3261" b="-26087"/>
-                </a:stretch>
-              </a:blipFill>
-            </p:spPr>
-            <p:txBody>
-              <a:bodyPr/>
-              <a:lstStyle/>
-              <a:p>
-                <a:r>
-                  <a:rPr lang="en-US">
-                    <a:noFill/>
-                  </a:rPr>
-                  <a:t> </a:t>
-                </a:r>
-              </a:p>
-            </p:txBody>
-          </p:sp>
-        </mc:Fallback>
-      </mc:AlternateContent>
-      <mc:AlternateContent xmlns:mc="http://schemas.openxmlformats.org/markup-compatibility/2006">
-        <mc:Choice xmlns:a14="http://schemas.microsoft.com/office/drawing/2010/main" Requires="a14">
-          <p:sp>
-            <p:nvSpPr>
-              <p:cNvPr id="7" name="TextBox 6">
-                <a:extLst>
-                  <a:ext uri="{FF2B5EF4-FFF2-40B4-BE49-F238E27FC236}">
-                    <a16:creationId xmlns:a16="http://schemas.microsoft.com/office/drawing/2014/main" id="{4E25F017-BCE8-1249-8C93-20491398FD4F}"/>
-                  </a:ext>
-                </a:extLst>
-              </p:cNvPr>
-              <p:cNvSpPr txBox="1"/>
-              <p:nvPr/>
-            </p:nvSpPr>
-            <p:spPr>
-              <a:xfrm>
-                <a:off x="4806710" y="1880344"/>
-                <a:ext cx="3529876" cy="276999"/>
-              </a:xfrm>
-              <a:prstGeom prst="rect">
-                <a:avLst/>
-              </a:prstGeom>
-              <a:noFill/>
-            </p:spPr>
-            <p:txBody>
-              <a:bodyPr wrap="none" lIns="0" tIns="0" rIns="0" bIns="0" rtlCol="0">
-                <a:spAutoFit/>
-              </a:bodyPr>
-              <a:lstStyle/>
-              <a:p>
-                <a:pPr/>
-                <a14:m>
-                  <m:oMathPara xmlns:m="http://schemas.openxmlformats.org/officeDocument/2006/math">
-                    <m:oMathParaPr>
-                      <m:jc m:val="centerGroup"/>
-                    </m:oMathParaPr>
-                    <m:oMath xmlns:m="http://schemas.openxmlformats.org/officeDocument/2006/math">
-                      <m:r>
-                        <a:rPr lang="en-US" b="0" i="1" smtClean="0">
-                          <a:latin typeface="Cambria Math" panose="02040503050406030204" pitchFamily="18" charset="0"/>
-                        </a:rPr>
-                        <m:t>𝑦</m:t>
-                      </m:r>
-                      <m:r>
-                        <a:rPr lang="en-US" b="0" i="1" smtClean="0">
-                          <a:latin typeface="Cambria Math" panose="02040503050406030204" pitchFamily="18" charset="0"/>
-                        </a:rPr>
-                        <m:t>=</m:t>
-                      </m:r>
-                      <m:sSub>
-                        <m:sSubPr>
-                          <m:ctrlPr>
-                            <a:rPr lang="en-US" b="0" i="1" smtClean="0">
-                              <a:latin typeface="Cambria Math" panose="02040503050406030204" pitchFamily="18" charset="0"/>
-                            </a:rPr>
-                          </m:ctrlPr>
-                        </m:sSubPr>
-                        <m:e>
-                          <m:r>
-                            <a:rPr lang="en-US" b="0" i="1" smtClean="0">
-                              <a:latin typeface="Cambria Math" panose="02040503050406030204" pitchFamily="18" charset="0"/>
-                            </a:rPr>
-                            <m:t>𝑎</m:t>
-                          </m:r>
-                        </m:e>
-                        <m:sub>
-                          <m:r>
-                            <a:rPr lang="en-US" b="0" i="1" smtClean="0">
-                              <a:latin typeface="Cambria Math" panose="02040503050406030204" pitchFamily="18" charset="0"/>
-                            </a:rPr>
-                            <m:t>1</m:t>
-                          </m:r>
-                        </m:sub>
-                      </m:sSub>
-                      <m:r>
-                        <a:rPr lang="en-US" b="0" i="1" smtClean="0">
-                          <a:latin typeface="Cambria Math" panose="02040503050406030204" pitchFamily="18" charset="0"/>
-                        </a:rPr>
-                        <m:t>𝑥</m:t>
-                      </m:r>
-                      <m:r>
-                        <a:rPr lang="en-US" b="0" i="1" smtClean="0">
-                          <a:latin typeface="Cambria Math" panose="02040503050406030204" pitchFamily="18" charset="0"/>
-                        </a:rPr>
-                        <m:t>+</m:t>
-                      </m:r>
-                      <m:sSub>
-                        <m:sSubPr>
-                          <m:ctrlPr>
-                            <a:rPr lang="en-US" b="0" i="1" smtClean="0">
-                              <a:latin typeface="Cambria Math" panose="02040503050406030204" pitchFamily="18" charset="0"/>
-                            </a:rPr>
-                          </m:ctrlPr>
-                        </m:sSubPr>
-                        <m:e>
-                          <m:r>
-                            <a:rPr lang="en-US" b="0" i="1" smtClean="0">
-                              <a:latin typeface="Cambria Math" panose="02040503050406030204" pitchFamily="18" charset="0"/>
-                            </a:rPr>
-                            <m:t>𝑎</m:t>
-                          </m:r>
-                        </m:e>
-                        <m:sub>
-                          <m:r>
-                            <a:rPr lang="en-US" b="0" i="1" smtClean="0">
-                              <a:latin typeface="Cambria Math" panose="02040503050406030204" pitchFamily="18" charset="0"/>
-                            </a:rPr>
-                            <m:t>2</m:t>
-                          </m:r>
-                        </m:sub>
-                      </m:sSub>
-                      <m:sSup>
-                        <m:sSupPr>
-                          <m:ctrlPr>
-                            <a:rPr lang="en-US" b="0" i="1" smtClean="0">
-                              <a:latin typeface="Cambria Math" panose="02040503050406030204" pitchFamily="18" charset="0"/>
-                            </a:rPr>
-                          </m:ctrlPr>
-                        </m:sSupPr>
-                        <m:e>
-                          <m:r>
-                            <a:rPr lang="en-US" b="0" i="1" smtClean="0">
-                              <a:latin typeface="Cambria Math" panose="02040503050406030204" pitchFamily="18" charset="0"/>
-                            </a:rPr>
-                            <m:t>𝑥</m:t>
-                          </m:r>
-                        </m:e>
-                        <m:sup>
-                          <m:r>
-                            <a:rPr lang="en-US" b="0" i="1" smtClean="0">
-                              <a:latin typeface="Cambria Math" panose="02040503050406030204" pitchFamily="18" charset="0"/>
-                            </a:rPr>
-                            <m:t>2</m:t>
-                          </m:r>
-                        </m:sup>
-                      </m:sSup>
-                      <m:r>
-                        <a:rPr lang="en-US" b="0" i="1" smtClean="0">
-                          <a:latin typeface="Cambria Math" panose="02040503050406030204" pitchFamily="18" charset="0"/>
-                        </a:rPr>
-                        <m:t>+</m:t>
-                      </m:r>
-                      <m:sSub>
-                        <m:sSubPr>
-                          <m:ctrlPr>
-                            <a:rPr lang="en-US" b="0" i="1" smtClean="0">
-                              <a:latin typeface="Cambria Math" panose="02040503050406030204" pitchFamily="18" charset="0"/>
-                            </a:rPr>
-                          </m:ctrlPr>
-                        </m:sSubPr>
-                        <m:e>
-                          <m:r>
-                            <a:rPr lang="en-US" b="0" i="1" smtClean="0">
-                              <a:latin typeface="Cambria Math" panose="02040503050406030204" pitchFamily="18" charset="0"/>
-                            </a:rPr>
-                            <m:t>𝑎</m:t>
-                          </m:r>
-                        </m:e>
-                        <m:sub>
-                          <m:r>
-                            <a:rPr lang="en-US" b="0" i="1" smtClean="0">
-                              <a:latin typeface="Cambria Math" panose="02040503050406030204" pitchFamily="18" charset="0"/>
-                            </a:rPr>
-                            <m:t>3</m:t>
-                          </m:r>
-                        </m:sub>
-                      </m:sSub>
-                      <m:sSup>
-                        <m:sSupPr>
-                          <m:ctrlPr>
-                            <a:rPr lang="en-US" b="0" i="1" smtClean="0">
-                              <a:latin typeface="Cambria Math" panose="02040503050406030204" pitchFamily="18" charset="0"/>
-                            </a:rPr>
-                          </m:ctrlPr>
-                        </m:sSupPr>
-                        <m:e>
-                          <m:r>
-                            <a:rPr lang="en-US" b="0" i="1" smtClean="0">
-                              <a:latin typeface="Cambria Math" panose="02040503050406030204" pitchFamily="18" charset="0"/>
-                            </a:rPr>
-                            <m:t>𝑥</m:t>
-                          </m:r>
-                        </m:e>
-                        <m:sup>
-                          <m:r>
-                            <a:rPr lang="en-US" b="0" i="1" smtClean="0">
-                              <a:latin typeface="Cambria Math" panose="02040503050406030204" pitchFamily="18" charset="0"/>
-                            </a:rPr>
-                            <m:t>3</m:t>
-                          </m:r>
-                        </m:sup>
-                      </m:sSup>
-                      <m:r>
-                        <a:rPr lang="en-US" b="0" i="1" smtClean="0">
-                          <a:latin typeface="Cambria Math" panose="02040503050406030204" pitchFamily="18" charset="0"/>
-                        </a:rPr>
-                        <m:t>+</m:t>
-                      </m:r>
-                      <m:sSub>
-                        <m:sSubPr>
-                          <m:ctrlPr>
-                            <a:rPr lang="en-US" b="0" i="1" smtClean="0">
-                              <a:latin typeface="Cambria Math" panose="02040503050406030204" pitchFamily="18" charset="0"/>
-                            </a:rPr>
-                          </m:ctrlPr>
-                        </m:sSubPr>
-                        <m:e>
-                          <m:r>
-                            <a:rPr lang="en-US" b="0" i="1" smtClean="0">
-                              <a:latin typeface="Cambria Math" panose="02040503050406030204" pitchFamily="18" charset="0"/>
-                            </a:rPr>
-                            <m:t>𝑎</m:t>
-                          </m:r>
-                        </m:e>
-                        <m:sub>
-                          <m:r>
-                            <a:rPr lang="en-US" b="0" i="1" smtClean="0">
-                              <a:latin typeface="Cambria Math" panose="02040503050406030204" pitchFamily="18" charset="0"/>
-                            </a:rPr>
-                            <m:t>4</m:t>
-                          </m:r>
-                        </m:sub>
-                      </m:sSub>
-                      <m:sSup>
-                        <m:sSupPr>
-                          <m:ctrlPr>
-                            <a:rPr lang="en-US" b="0" i="1" smtClean="0">
-                              <a:latin typeface="Cambria Math" panose="02040503050406030204" pitchFamily="18" charset="0"/>
-                            </a:rPr>
-                          </m:ctrlPr>
-                        </m:sSupPr>
-                        <m:e>
-                          <m:r>
-                            <a:rPr lang="en-US" b="0" i="1" smtClean="0">
-                              <a:latin typeface="Cambria Math" panose="02040503050406030204" pitchFamily="18" charset="0"/>
-                            </a:rPr>
-                            <m:t>𝑥</m:t>
-                          </m:r>
-                        </m:e>
-                        <m:sup>
-                          <m:r>
-                            <a:rPr lang="en-US" b="0" i="1" smtClean="0">
-                              <a:latin typeface="Cambria Math" panose="02040503050406030204" pitchFamily="18" charset="0"/>
-                            </a:rPr>
-                            <m:t>4</m:t>
-                          </m:r>
-                        </m:sup>
-                      </m:sSup>
-                      <m:r>
-                        <a:rPr lang="en-US" b="0" i="1" smtClean="0">
-                          <a:latin typeface="Cambria Math" panose="02040503050406030204" pitchFamily="18" charset="0"/>
-                        </a:rPr>
-                        <m:t>+</m:t>
-                      </m:r>
-                      <m:r>
-                        <a:rPr lang="en-US" b="0" i="1" smtClean="0">
-                          <a:latin typeface="Cambria Math" panose="02040503050406030204" pitchFamily="18" charset="0"/>
-                        </a:rPr>
-                        <m:t>𝑏</m:t>
-                      </m:r>
-                    </m:oMath>
-                  </m:oMathPara>
-                </a14:m>
-                <a:endParaRPr lang="en-US" dirty="0"/>
-              </a:p>
-            </p:txBody>
-          </p:sp>
-        </mc:Choice>
-        <mc:Fallback>
-          <p:sp>
-            <p:nvSpPr>
-              <p:cNvPr id="7" name="TextBox 6">
-                <a:extLst>
-                  <a:ext uri="{FF2B5EF4-FFF2-40B4-BE49-F238E27FC236}">
-                    <a16:creationId xmlns:a16="http://schemas.microsoft.com/office/drawing/2014/main" id="{4E25F017-BCE8-1249-8C93-20491398FD4F}"/>
-                  </a:ext>
-                </a:extLst>
-              </p:cNvPr>
-              <p:cNvSpPr txBox="1">
-                <a:spLocks noRot="1" noChangeAspect="1" noMove="1" noResize="1" noEditPoints="1" noAdjustHandles="1" noChangeArrowheads="1" noChangeShapeType="1" noTextEdit="1"/>
-              </p:cNvSpPr>
-              <p:nvPr/>
-            </p:nvSpPr>
-            <p:spPr>
-              <a:xfrm>
-                <a:off x="4806710" y="1880344"/>
-                <a:ext cx="3529876" cy="276999"/>
-              </a:xfrm>
-              <a:prstGeom prst="rect">
-                <a:avLst/>
-              </a:prstGeom>
-              <a:blipFill>
-                <a:blip r:embed="rId6"/>
-                <a:stretch>
-                  <a:fillRect l="-717" r="-1075" b="-26087"/>
-                </a:stretch>
-              </a:blipFill>
-            </p:spPr>
-            <p:txBody>
-              <a:bodyPr/>
-              <a:lstStyle/>
-              <a:p>
-                <a:r>
-                  <a:rPr lang="en-US">
-                    <a:noFill/>
-                  </a:rPr>
-                  <a:t> </a:t>
-                </a:r>
-              </a:p>
-            </p:txBody>
-          </p:sp>
-        </mc:Fallback>
-      </mc:AlternateContent>
-      <mc:AlternateContent xmlns:mc="http://schemas.openxmlformats.org/markup-compatibility/2006">
-        <mc:Choice xmlns:a14="http://schemas.microsoft.com/office/drawing/2010/main" Requires="a14">
-          <p:sp>
-            <p:nvSpPr>
-              <p:cNvPr id="9" name="Rectangle 8">
-                <a:extLst>
-                  <a:ext uri="{FF2B5EF4-FFF2-40B4-BE49-F238E27FC236}">
-                    <a16:creationId xmlns:a16="http://schemas.microsoft.com/office/drawing/2014/main" id="{D8AD2DC4-9639-A44E-ABDF-3E6CC00A001F}"/>
-                  </a:ext>
-                </a:extLst>
-              </p:cNvPr>
-              <p:cNvSpPr/>
-              <p:nvPr/>
-            </p:nvSpPr>
-            <p:spPr>
-              <a:xfrm>
-                <a:off x="723307" y="891274"/>
-                <a:ext cx="6134693" cy="861326"/>
-              </a:xfrm>
-              <a:prstGeom prst="rect">
-                <a:avLst/>
-              </a:prstGeom>
-            </p:spPr>
-            <p:txBody>
-              <a:bodyPr wrap="none">
-                <a:spAutoFit/>
-              </a:bodyPr>
-              <a:lstStyle/>
-              <a:p>
-                <a14:m>
-                  <m:oMathPara xmlns:m="http://schemas.openxmlformats.org/officeDocument/2006/math">
-                    <m:oMathParaPr>
-                      <m:jc m:val="centerGroup"/>
-                    </m:oMathParaPr>
-                    <m:oMath xmlns:m="http://schemas.openxmlformats.org/officeDocument/2006/math">
-                      <m:sSup>
-                        <m:sSupPr>
-                          <m:ctrlPr>
-                            <a:rPr lang="en-US" sz="2400" i="1" smtClean="0">
-                              <a:latin typeface="Cambria Math" panose="02040503050406030204" pitchFamily="18" charset="0"/>
-                            </a:rPr>
-                          </m:ctrlPr>
-                        </m:sSupPr>
-                        <m:e>
-                          <m:r>
-                            <a:rPr lang="en-US" sz="2400" i="1">
-                              <a:latin typeface="Cambria Math" panose="02040503050406030204" pitchFamily="18" charset="0"/>
-                            </a:rPr>
-                            <m:t>𝑅</m:t>
-                          </m:r>
-                        </m:e>
-                        <m:sup>
-                          <m:r>
-                            <a:rPr lang="en-US" sz="2400" i="1">
-                              <a:latin typeface="Cambria Math" panose="02040503050406030204" pitchFamily="18" charset="0"/>
-                            </a:rPr>
-                            <m:t>2</m:t>
-                          </m:r>
-                        </m:sup>
-                      </m:sSup>
-                      <m:r>
-                        <a:rPr lang="en-US" sz="2400" i="1">
-                          <a:latin typeface="Cambria Math" panose="02040503050406030204" pitchFamily="18" charset="0"/>
-                        </a:rPr>
-                        <m:t>=</m:t>
-                      </m:r>
-                      <m:f>
-                        <m:fPr>
-                          <m:ctrlPr>
-                            <a:rPr lang="en-US" sz="2400" i="1">
-                              <a:latin typeface="Cambria Math" panose="02040503050406030204" pitchFamily="18" charset="0"/>
-                            </a:rPr>
-                          </m:ctrlPr>
-                        </m:fPr>
-                        <m:num>
-                          <m:r>
-                            <a:rPr lang="en-US" sz="2400" i="1">
-                              <a:latin typeface="Cambria Math" panose="02040503050406030204" pitchFamily="18" charset="0"/>
-                            </a:rPr>
-                            <m:t>𝑣𝑎𝑟</m:t>
-                          </m:r>
-                          <m:r>
-                            <a:rPr lang="en-US" sz="2400" i="1">
-                              <a:latin typeface="Cambria Math" panose="02040503050406030204" pitchFamily="18" charset="0"/>
-                            </a:rPr>
-                            <m:t>(</m:t>
-                          </m:r>
-                          <m:r>
-                            <a:rPr lang="en-US" sz="2400" b="0" i="1" smtClean="0">
-                              <a:latin typeface="Cambria Math" panose="02040503050406030204" pitchFamily="18" charset="0"/>
-                            </a:rPr>
-                            <m:t>𝑓𝑖𝑡𝑡𝑒𝑑</m:t>
-                          </m:r>
-                          <m:r>
-                            <a:rPr lang="en-US" sz="2400" i="1">
-                              <a:latin typeface="Cambria Math" panose="02040503050406030204" pitchFamily="18" charset="0"/>
-                            </a:rPr>
-                            <m:t>)</m:t>
-                          </m:r>
-                        </m:num>
-                        <m:den>
-                          <m:r>
-                            <a:rPr lang="en-US" sz="2400" i="1">
-                              <a:latin typeface="Cambria Math" panose="02040503050406030204" pitchFamily="18" charset="0"/>
-                            </a:rPr>
-                            <m:t>𝑣𝑎𝑟</m:t>
-                          </m:r>
-                          <m:r>
-                            <a:rPr lang="en-US" sz="2400" i="1">
-                              <a:latin typeface="Cambria Math" panose="02040503050406030204" pitchFamily="18" charset="0"/>
-                            </a:rPr>
-                            <m:t>(</m:t>
-                          </m:r>
-                          <m:r>
-                            <a:rPr lang="en-US" sz="2400" i="1">
-                              <a:latin typeface="Cambria Math" panose="02040503050406030204" pitchFamily="18" charset="0"/>
-                            </a:rPr>
-                            <m:t>𝑜𝑏𝑠𝑒𝑟𝑣𝑒𝑑</m:t>
-                          </m:r>
-                          <m:r>
-                            <a:rPr lang="en-US" sz="2400" i="1">
-                              <a:latin typeface="Cambria Math" panose="02040503050406030204" pitchFamily="18" charset="0"/>
-                            </a:rPr>
-                            <m:t>)</m:t>
-                          </m:r>
-                        </m:den>
-                      </m:f>
-                      <m:r>
-                        <a:rPr lang="en-US" sz="2400" b="0" i="1" smtClean="0">
-                          <a:latin typeface="Cambria Math" panose="02040503050406030204" pitchFamily="18" charset="0"/>
-                        </a:rPr>
-                        <m:t>=1 −</m:t>
-                      </m:r>
-                      <m:f>
-                        <m:fPr>
-                          <m:ctrlPr>
-                            <a:rPr lang="en-US" sz="2400" i="1">
-                              <a:latin typeface="Cambria Math" panose="02040503050406030204" pitchFamily="18" charset="0"/>
-                            </a:rPr>
-                          </m:ctrlPr>
-                        </m:fPr>
-                        <m:num>
-                          <m:r>
-                            <a:rPr lang="en-US" sz="2400" i="1">
-                              <a:latin typeface="Cambria Math" panose="02040503050406030204" pitchFamily="18" charset="0"/>
-                            </a:rPr>
-                            <m:t>𝑣𝑎𝑟</m:t>
-                          </m:r>
-                          <m:r>
-                            <a:rPr lang="en-US" sz="2400" i="1">
-                              <a:latin typeface="Cambria Math" panose="02040503050406030204" pitchFamily="18" charset="0"/>
-                            </a:rPr>
-                            <m:t>(</m:t>
-                          </m:r>
-                          <m:r>
-                            <a:rPr lang="en-US" sz="2400" b="0" i="1" smtClean="0">
-                              <a:latin typeface="Cambria Math" panose="02040503050406030204" pitchFamily="18" charset="0"/>
-                            </a:rPr>
-                            <m:t>𝑟𝑒𝑠𝑖𝑑𝑢𝑎𝑙𝑠</m:t>
-                          </m:r>
-                          <m:r>
-                            <a:rPr lang="en-US" sz="2400" i="1">
-                              <a:latin typeface="Cambria Math" panose="02040503050406030204" pitchFamily="18" charset="0"/>
-                            </a:rPr>
-                            <m:t>)</m:t>
-                          </m:r>
-                        </m:num>
-                        <m:den>
-                          <m:r>
-                            <a:rPr lang="en-US" sz="2400" i="1">
-                              <a:latin typeface="Cambria Math" panose="02040503050406030204" pitchFamily="18" charset="0"/>
-                            </a:rPr>
-                            <m:t>𝑣𝑎𝑟</m:t>
-                          </m:r>
-                          <m:r>
-                            <a:rPr lang="en-US" sz="2400" i="1">
-                              <a:latin typeface="Cambria Math" panose="02040503050406030204" pitchFamily="18" charset="0"/>
-                            </a:rPr>
-                            <m:t>(</m:t>
-                          </m:r>
-                          <m:r>
-                            <a:rPr lang="en-US" sz="2400" i="1">
-                              <a:latin typeface="Cambria Math" panose="02040503050406030204" pitchFamily="18" charset="0"/>
-                            </a:rPr>
-                            <m:t>𝑜𝑏𝑠𝑒𝑟𝑣𝑒𝑑</m:t>
-                          </m:r>
-                          <m:r>
-                            <a:rPr lang="en-US" sz="2400" i="1">
-                              <a:latin typeface="Cambria Math" panose="02040503050406030204" pitchFamily="18" charset="0"/>
-                            </a:rPr>
-                            <m:t>)</m:t>
-                          </m:r>
-                        </m:den>
-                      </m:f>
-                    </m:oMath>
-                  </m:oMathPara>
-                </a14:m>
-                <a:endParaRPr lang="en-US" sz="2400" dirty="0"/>
-              </a:p>
-            </p:txBody>
-          </p:sp>
-        </mc:Choice>
-        <mc:Fallback>
-          <p:sp>
-            <p:nvSpPr>
-              <p:cNvPr id="9" name="Rectangle 8">
-                <a:extLst>
-                  <a:ext uri="{FF2B5EF4-FFF2-40B4-BE49-F238E27FC236}">
-                    <a16:creationId xmlns:a16="http://schemas.microsoft.com/office/drawing/2014/main" id="{D8AD2DC4-9639-A44E-ABDF-3E6CC00A001F}"/>
-                  </a:ext>
-                </a:extLst>
-              </p:cNvPr>
-              <p:cNvSpPr>
-                <a:spLocks noRot="1" noChangeAspect="1" noMove="1" noResize="1" noEditPoints="1" noAdjustHandles="1" noChangeArrowheads="1" noChangeShapeType="1" noTextEdit="1"/>
-              </p:cNvSpPr>
-              <p:nvPr/>
-            </p:nvSpPr>
-            <p:spPr>
-              <a:xfrm>
-                <a:off x="723307" y="891274"/>
-                <a:ext cx="6134693" cy="861326"/>
-              </a:xfrm>
-              <a:prstGeom prst="rect">
-                <a:avLst/>
-              </a:prstGeom>
-              <a:blipFill>
-                <a:blip r:embed="rId7"/>
-                <a:stretch>
-                  <a:fillRect b="-8696"/>
-                </a:stretch>
-              </a:blipFill>
-            </p:spPr>
-            <p:txBody>
-              <a:bodyPr/>
-              <a:lstStyle/>
-              <a:p>
-                <a:r>
-                  <a:rPr lang="en-US">
-                    <a:noFill/>
-                  </a:rPr>
-                  <a:t> </a:t>
-                </a:r>
-              </a:p>
-            </p:txBody>
-          </p:sp>
-        </mc:Fallback>
-      </mc:AlternateContent>
-      <p:pic>
-        <p:nvPicPr>
-          <p:cNvPr id="11" name="Picture 10">
-            <a:extLst>
-              <a:ext uri="{FF2B5EF4-FFF2-40B4-BE49-F238E27FC236}">
-                <a16:creationId xmlns:a16="http://schemas.microsoft.com/office/drawing/2014/main" id="{0308C791-94AE-8A40-A302-D19B253E92AB}"/>
-              </a:ext>
-            </a:extLst>
-          </p:cNvPr>
-          <p:cNvPicPr>
-            <a:picLocks noChangeAspect="1"/>
-          </p:cNvPicPr>
-          <p:nvPr/>
-        </p:nvPicPr>
-        <p:blipFill>
-          <a:blip r:embed="rId8"/>
-          <a:stretch>
-            <a:fillRect/>
-          </a:stretch>
-        </p:blipFill>
-        <p:spPr>
-          <a:xfrm>
-            <a:off x="4544575" y="3891459"/>
-            <a:ext cx="2807970" cy="2077766"/>
-          </a:xfrm>
-          <a:prstGeom prst="rect">
-            <a:avLst/>
-          </a:prstGeom>
-        </p:spPr>
-      </p:pic>
-      <p:pic>
-        <p:nvPicPr>
-          <p:cNvPr id="12" name="Picture 11">
-            <a:extLst>
-              <a:ext uri="{FF2B5EF4-FFF2-40B4-BE49-F238E27FC236}">
-                <a16:creationId xmlns:a16="http://schemas.microsoft.com/office/drawing/2014/main" id="{F1EAF5CF-0E7B-6C4E-827A-1B2BAA3F9B81}"/>
-              </a:ext>
-            </a:extLst>
-          </p:cNvPr>
-          <p:cNvPicPr>
-            <a:picLocks noChangeAspect="1"/>
-          </p:cNvPicPr>
-          <p:nvPr/>
-        </p:nvPicPr>
-        <p:blipFill>
-          <a:blip r:embed="rId9"/>
-          <a:stretch>
-            <a:fillRect/>
-          </a:stretch>
-        </p:blipFill>
-        <p:spPr>
-          <a:xfrm>
-            <a:off x="1524000" y="3927902"/>
-            <a:ext cx="2747011" cy="1848220"/>
-          </a:xfrm>
-          <a:prstGeom prst="rect">
-            <a:avLst/>
-          </a:prstGeom>
-        </p:spPr>
-      </p:pic>
-      <p:sp>
-        <p:nvSpPr>
-          <p:cNvPr id="13" name="TextBox 12">
-            <a:extLst>
-              <a:ext uri="{FF2B5EF4-FFF2-40B4-BE49-F238E27FC236}">
-                <a16:creationId xmlns:a16="http://schemas.microsoft.com/office/drawing/2014/main" id="{8F725332-8B67-1B46-94F2-9CA7F06D7093}"/>
-              </a:ext>
-            </a:extLst>
-          </p:cNvPr>
-          <p:cNvSpPr txBox="1"/>
-          <p:nvPr/>
-        </p:nvSpPr>
-        <p:spPr>
-          <a:xfrm>
-            <a:off x="304800" y="2743200"/>
-            <a:ext cx="864339" cy="369332"/>
-          </a:xfrm>
-          <a:prstGeom prst="rect">
-            <a:avLst/>
-          </a:prstGeom>
-          <a:noFill/>
-        </p:spPr>
-        <p:txBody>
-          <a:bodyPr wrap="none" rtlCol="0">
-            <a:spAutoFit/>
-          </a:bodyPr>
-          <a:lstStyle/>
-          <a:p>
-            <a:r>
-              <a:rPr lang="en-US" dirty="0"/>
-              <a:t>Data 1</a:t>
-            </a:r>
-          </a:p>
-        </p:txBody>
-      </p:sp>
-      <p:sp>
-        <p:nvSpPr>
-          <p:cNvPr id="14" name="TextBox 13">
-            <a:extLst>
-              <a:ext uri="{FF2B5EF4-FFF2-40B4-BE49-F238E27FC236}">
-                <a16:creationId xmlns:a16="http://schemas.microsoft.com/office/drawing/2014/main" id="{C099A52B-DBFF-2443-90C6-83AB8DA994B9}"/>
-              </a:ext>
-            </a:extLst>
-          </p:cNvPr>
-          <p:cNvSpPr txBox="1"/>
-          <p:nvPr/>
-        </p:nvSpPr>
-        <p:spPr>
-          <a:xfrm>
-            <a:off x="304800" y="4507468"/>
-            <a:ext cx="864339" cy="369332"/>
-          </a:xfrm>
-          <a:prstGeom prst="rect">
-            <a:avLst/>
-          </a:prstGeom>
-          <a:noFill/>
-        </p:spPr>
-        <p:txBody>
-          <a:bodyPr wrap="none" rtlCol="0">
-            <a:spAutoFit/>
-          </a:bodyPr>
-          <a:lstStyle/>
-          <a:p>
-            <a:r>
-              <a:rPr lang="en-US" dirty="0"/>
-              <a:t>Data 2</a:t>
-            </a:r>
-          </a:p>
-        </p:txBody>
-      </p:sp>
-      <p:sp>
-        <p:nvSpPr>
-          <p:cNvPr id="15" name="TextBox 14">
-            <a:extLst>
-              <a:ext uri="{FF2B5EF4-FFF2-40B4-BE49-F238E27FC236}">
-                <a16:creationId xmlns:a16="http://schemas.microsoft.com/office/drawing/2014/main" id="{2EB17513-4996-A94F-A515-C5FBF8C63838}"/>
-              </a:ext>
-            </a:extLst>
-          </p:cNvPr>
-          <p:cNvSpPr txBox="1"/>
-          <p:nvPr/>
-        </p:nvSpPr>
-        <p:spPr>
-          <a:xfrm>
-            <a:off x="2045447" y="2368034"/>
-            <a:ext cx="633507" cy="369332"/>
-          </a:xfrm>
-          <a:prstGeom prst="rect">
-            <a:avLst/>
-          </a:prstGeom>
-          <a:noFill/>
-        </p:spPr>
-        <p:txBody>
-          <a:bodyPr wrap="none" rtlCol="0">
-            <a:spAutoFit/>
-          </a:bodyPr>
-          <a:lstStyle/>
-          <a:p>
-            <a:r>
-              <a:rPr lang="en-US" dirty="0"/>
-              <a:t>0.85</a:t>
-            </a:r>
-          </a:p>
-        </p:txBody>
-      </p:sp>
-      <p:sp>
-        <p:nvSpPr>
-          <p:cNvPr id="16" name="TextBox 15">
-            <a:extLst>
-              <a:ext uri="{FF2B5EF4-FFF2-40B4-BE49-F238E27FC236}">
-                <a16:creationId xmlns:a16="http://schemas.microsoft.com/office/drawing/2014/main" id="{26E9DBAE-701B-424E-B8F6-7549FC30E75E}"/>
-              </a:ext>
-            </a:extLst>
-          </p:cNvPr>
-          <p:cNvSpPr txBox="1"/>
-          <p:nvPr/>
-        </p:nvSpPr>
-        <p:spPr>
-          <a:xfrm>
-            <a:off x="5055347" y="2368034"/>
-            <a:ext cx="633507" cy="369332"/>
-          </a:xfrm>
-          <a:prstGeom prst="rect">
-            <a:avLst/>
-          </a:prstGeom>
-          <a:noFill/>
-        </p:spPr>
-        <p:txBody>
-          <a:bodyPr wrap="none" rtlCol="0">
-            <a:spAutoFit/>
-          </a:bodyPr>
-          <a:lstStyle/>
-          <a:p>
-            <a:r>
-              <a:rPr lang="en-US" dirty="0"/>
-              <a:t>0.97</a:t>
-            </a:r>
-          </a:p>
-        </p:txBody>
-      </p:sp>
-      <p:sp>
-        <p:nvSpPr>
-          <p:cNvPr id="17" name="TextBox 16">
-            <a:extLst>
-              <a:ext uri="{FF2B5EF4-FFF2-40B4-BE49-F238E27FC236}">
-                <a16:creationId xmlns:a16="http://schemas.microsoft.com/office/drawing/2014/main" id="{5DCC45D4-814E-BB40-9784-CC59CC192CB7}"/>
-              </a:ext>
-            </a:extLst>
-          </p:cNvPr>
-          <p:cNvSpPr txBox="1"/>
-          <p:nvPr/>
-        </p:nvSpPr>
-        <p:spPr>
-          <a:xfrm>
-            <a:off x="2045447" y="4082534"/>
-            <a:ext cx="633507" cy="369332"/>
-          </a:xfrm>
-          <a:prstGeom prst="rect">
-            <a:avLst/>
-          </a:prstGeom>
-          <a:noFill/>
-        </p:spPr>
-        <p:txBody>
-          <a:bodyPr wrap="none" rtlCol="0">
-            <a:spAutoFit/>
-          </a:bodyPr>
-          <a:lstStyle/>
-          <a:p>
-            <a:r>
-              <a:rPr lang="en-US" dirty="0"/>
-              <a:t>0.85</a:t>
-            </a:r>
-          </a:p>
-        </p:txBody>
-      </p:sp>
-      <p:sp>
-        <p:nvSpPr>
-          <p:cNvPr id="18" name="TextBox 17">
-            <a:extLst>
-              <a:ext uri="{FF2B5EF4-FFF2-40B4-BE49-F238E27FC236}">
-                <a16:creationId xmlns:a16="http://schemas.microsoft.com/office/drawing/2014/main" id="{45552AA5-C128-A240-AD3E-F9076B1B792F}"/>
-              </a:ext>
-            </a:extLst>
-          </p:cNvPr>
-          <p:cNvSpPr txBox="1"/>
-          <p:nvPr/>
-        </p:nvSpPr>
-        <p:spPr>
-          <a:xfrm>
-            <a:off x="5055347" y="4082534"/>
-            <a:ext cx="633507" cy="369332"/>
-          </a:xfrm>
-          <a:prstGeom prst="rect">
-            <a:avLst/>
-          </a:prstGeom>
-          <a:noFill/>
-        </p:spPr>
-        <p:txBody>
-          <a:bodyPr wrap="none" rtlCol="0">
-            <a:spAutoFit/>
-          </a:bodyPr>
-          <a:lstStyle/>
-          <a:p>
-            <a:r>
-              <a:rPr lang="en-US" dirty="0"/>
-              <a:t>0.76</a:t>
-            </a:r>
-          </a:p>
-        </p:txBody>
-      </p:sp>
-    </p:spTree>
-    <p:extLst>
-      <p:ext uri="{BB962C8B-B14F-4D97-AF65-F5344CB8AC3E}">
-        <p14:creationId xmlns:p14="http://schemas.microsoft.com/office/powerpoint/2010/main" val="2052200737"/>
-      </p:ext>
-    </p:extLst>
-  </p:cSld>
-  <p:clrMapOvr>
-    <a:masterClrMapping/>
-  </p:clrMapOvr>
-  <p:timing>
-    <p:tnLst>
-      <p:par>
-        <p:cTn id="1" dur="indefinite" restart="never" nodeType="tmRoot">
-          <p:childTnLst>
-            <p:seq concurrent="1" nextAc="seek">
-              <p:cTn id="2" dur="indefinite" nodeType="mainSeq">
-                <p:childTnLst>
-                  <p:par>
-                    <p:cTn id="3" fill="hold">
-                      <p:stCondLst>
-                        <p:cond delay="indefinite"/>
-                      </p:stCondLst>
-                      <p:childTnLst>
-                        <p:par>
-                          <p:cTn id="4" fill="hold">
-                            <p:stCondLst>
-                              <p:cond delay="0"/>
-                            </p:stCondLst>
-                            <p:childTnLst>
-                              <p:par>
-                                <p:cTn id="5" presetID="1" presetClass="entr" presetSubtype="0" fill="hold" nodeType="clickEffect">
-                                  <p:stCondLst>
-                                    <p:cond delay="0"/>
-                                  </p:stCondLst>
-                                  <p:childTnLst>
-                                    <p:set>
-                                      <p:cBhvr>
-                                        <p:cTn id="6" dur="1" fill="hold">
-                                          <p:stCondLst>
-                                            <p:cond delay="0"/>
-                                          </p:stCondLst>
-                                        </p:cTn>
-                                        <p:tgtEl>
-                                          <p:spTgt spid="12"/>
-                                        </p:tgtEl>
-                                        <p:attrNameLst>
-                                          <p:attrName>style.visibility</p:attrName>
-                                        </p:attrNameLst>
-                                      </p:cBhvr>
-                                      <p:to>
-                                        <p:strVal val="visible"/>
-                                      </p:to>
-                                    </p:set>
-                                  </p:childTnLst>
-                                </p:cTn>
-                              </p:par>
-                              <p:par>
-                                <p:cTn id="7" presetID="1" presetClass="entr" presetSubtype="0" fill="hold" nodeType="withEffect">
-                                  <p:stCondLst>
-                                    <p:cond delay="0"/>
-                                  </p:stCondLst>
-                                  <p:childTnLst>
-                                    <p:set>
-                                      <p:cBhvr>
-                                        <p:cTn id="8" dur="1" fill="hold">
-                                          <p:stCondLst>
-                                            <p:cond delay="0"/>
-                                          </p:stCondLst>
-                                        </p:cTn>
-                                        <p:tgtEl>
-                                          <p:spTgt spid="11"/>
-                                        </p:tgtEl>
-                                        <p:attrNameLst>
-                                          <p:attrName>style.visibility</p:attrName>
-                                        </p:attrNameLst>
-                                      </p:cBhvr>
-                                      <p:to>
-                                        <p:strVal val="visible"/>
-                                      </p:to>
-                                    </p:set>
-                                  </p:childTnLst>
-                                </p:cTn>
-                              </p:par>
-                            </p:childTnLst>
-                          </p:cTn>
-                        </p:par>
-                      </p:childTnLst>
-                    </p:cTn>
-                  </p:par>
-                  <p:par>
-                    <p:cTn id="9" fill="hold">
-                      <p:stCondLst>
-                        <p:cond delay="indefinite"/>
-                      </p:stCondLst>
-                      <p:childTnLst>
-                        <p:par>
-                          <p:cTn id="10" fill="hold">
-                            <p:stCondLst>
-                              <p:cond delay="0"/>
-                            </p:stCondLst>
-                            <p:childTnLst>
-                              <p:par>
-                                <p:cTn id="11" presetID="1" presetClass="entr" presetSubtype="0" fill="hold" grpId="0" nodeType="clickEffect">
-                                  <p:stCondLst>
-                                    <p:cond delay="0"/>
-                                  </p:stCondLst>
-                                  <p:childTnLst>
-                                    <p:set>
-                                      <p:cBhvr>
-                                        <p:cTn id="12" dur="1" fill="hold">
-                                          <p:stCondLst>
-                                            <p:cond delay="0"/>
-                                          </p:stCondLst>
-                                        </p:cTn>
-                                        <p:tgtEl>
-                                          <p:spTgt spid="15"/>
-                                        </p:tgtEl>
-                                        <p:attrNameLst>
-                                          <p:attrName>style.visibility</p:attrName>
-                                        </p:attrNameLst>
-                                      </p:cBhvr>
-                                      <p:to>
-                                        <p:strVal val="visible"/>
-                                      </p:to>
-                                    </p:set>
-                                  </p:childTnLst>
-                                </p:cTn>
-                              </p:par>
-                              <p:par>
-                                <p:cTn id="13" presetID="1" presetClass="entr" presetSubtype="0" fill="hold" grpId="0" nodeType="withEffect">
-                                  <p:stCondLst>
-                                    <p:cond delay="0"/>
-                                  </p:stCondLst>
-                                  <p:childTnLst>
-                                    <p:set>
-                                      <p:cBhvr>
-                                        <p:cTn id="14" dur="1" fill="hold">
-                                          <p:stCondLst>
-                                            <p:cond delay="0"/>
-                                          </p:stCondLst>
-                                        </p:cTn>
-                                        <p:tgtEl>
-                                          <p:spTgt spid="17"/>
-                                        </p:tgtEl>
-                                        <p:attrNameLst>
-                                          <p:attrName>style.visibility</p:attrName>
-                                        </p:attrNameLst>
-                                      </p:cBhvr>
-                                      <p:to>
-                                        <p:strVal val="visible"/>
-                                      </p:to>
-                                    </p:set>
-                                  </p:childTnLst>
-                                </p:cTn>
-                              </p:par>
-                            </p:childTnLst>
-                          </p:cTn>
-                        </p:par>
-                      </p:childTnLst>
-                    </p:cTn>
-                  </p:par>
-                  <p:par>
-                    <p:cTn id="15" fill="hold">
-                      <p:stCondLst>
-                        <p:cond delay="indefinite"/>
-                      </p:stCondLst>
-                      <p:childTnLst>
-                        <p:par>
-                          <p:cTn id="16" fill="hold">
-                            <p:stCondLst>
-                              <p:cond delay="0"/>
-                            </p:stCondLst>
-                            <p:childTnLst>
-                              <p:par>
-                                <p:cTn id="17" presetID="1" presetClass="entr" presetSubtype="0" fill="hold" grpId="0" nodeType="clickEffect">
-                                  <p:stCondLst>
-                                    <p:cond delay="0"/>
-                                  </p:stCondLst>
-                                  <p:childTnLst>
-                                    <p:set>
-                                      <p:cBhvr>
-                                        <p:cTn id="18" dur="1" fill="hold">
-                                          <p:stCondLst>
-                                            <p:cond delay="0"/>
-                                          </p:stCondLst>
-                                        </p:cTn>
-                                        <p:tgtEl>
-                                          <p:spTgt spid="16"/>
-                                        </p:tgtEl>
-                                        <p:attrNameLst>
-                                          <p:attrName>style.visibility</p:attrName>
-                                        </p:attrNameLst>
-                                      </p:cBhvr>
-                                      <p:to>
-                                        <p:strVal val="visible"/>
-                                      </p:to>
-                                    </p:set>
-                                  </p:childTnLst>
-                                </p:cTn>
-                              </p:par>
-                              <p:par>
-                                <p:cTn id="19" presetID="1" presetClass="entr" presetSubtype="0" fill="hold" grpId="0" nodeType="withEffect">
-                                  <p:stCondLst>
-                                    <p:cond delay="0"/>
-                                  </p:stCondLst>
-                                  <p:childTnLst>
-                                    <p:set>
-                                      <p:cBhvr>
-                                        <p:cTn id="20" dur="1" fill="hold">
-                                          <p:stCondLst>
-                                            <p:cond delay="0"/>
-                                          </p:stCondLst>
-                                        </p:cTn>
-                                        <p:tgtEl>
-                                          <p:spTgt spid="18"/>
-                                        </p:tgtEl>
-                                        <p:attrNameLst>
-                                          <p:attrName>style.visibility</p:attrName>
-                                        </p:attrNameLst>
-                                      </p:cBhvr>
-                                      <p:to>
-                                        <p:strVal val="visible"/>
-                                      </p:to>
-                                    </p:set>
-                                  </p:childTnLst>
-                                </p:cTn>
-                              </p:par>
-                            </p:childTnLst>
-                          </p:cTn>
-                        </p:par>
-                      </p:childTnLst>
-                    </p:cTn>
-                  </p:par>
-                </p:childTnLst>
-              </p:cTn>
-              <p:prevCondLst>
-                <p:cond evt="onPrev" delay="0">
-                  <p:tgtEl>
-                    <p:sldTgt/>
-                  </p:tgtEl>
-                </p:cond>
-              </p:prevCondLst>
-              <p:nextCondLst>
-                <p:cond evt="onNext" delay="0">
-                  <p:tgtEl>
-                    <p:sldTgt/>
-                  </p:tgtEl>
-                </p:cond>
-              </p:nextCondLst>
-            </p:seq>
-          </p:childTnLst>
-        </p:cTn>
-      </p:par>
-    </p:tnLst>
-    <p:bldLst>
-      <p:bldP spid="15" grpId="0"/>
-      <p:bldP spid="16" grpId="0"/>
-      <p:bldP spid="17" grpId="0"/>
-      <p:bldP spid="18" grpId="0"/>
-    </p:bldLst>
-  </p:timing>
-</p:sld>
-</file>
-
-<file path=ppt/slides/slide11.xml><?xml version="1.0" encoding="utf-8"?>
 <p:sld xmlns:a="http://schemas.openxmlformats.org/drawingml/2006/main" xmlns:r="http://schemas.openxmlformats.org/officeDocument/2006/relationships" xmlns:p="http://schemas.openxmlformats.org/presentationml/2006/main">
   <p:cSld>
     <p:spTree>
@@ -6687,14 +5258,14 @@
               <a:pPr>
                 <a:defRPr/>
               </a:pPr>
-              <a:t>11</a:t>
+              <a:t>10</a:t>
             </a:fld>
             <a:endParaRPr lang="en-US" altLang="x-none"/>
           </a:p>
         </p:txBody>
       </p:sp>
-      <mc:AlternateContent xmlns:mc="http://schemas.openxmlformats.org/markup-compatibility/2006">
-        <mc:Choice xmlns:a14="http://schemas.microsoft.com/office/drawing/2010/main" Requires="a14">
+      <mc:AlternateContent xmlns:mc="http://schemas.openxmlformats.org/markup-compatibility/2006" xmlns:a14="http://schemas.microsoft.com/office/drawing/2010/main">
+        <mc:Choice Requires="a14">
           <p:sp>
             <p:nvSpPr>
               <p:cNvPr id="4" name="TextBox 3">
@@ -7167,7 +5738,7 @@
             </p:txBody>
           </p:sp>
         </mc:Choice>
-        <mc:Fallback>
+        <mc:Fallback xmlns="">
           <p:sp>
             <p:nvSpPr>
               <p:cNvPr id="4" name="TextBox 3">
@@ -7212,8 +5783,8 @@
           </p:sp>
         </mc:Fallback>
       </mc:AlternateContent>
-      <mc:AlternateContent xmlns:mc="http://schemas.openxmlformats.org/markup-compatibility/2006">
-        <mc:Choice xmlns:a14="http://schemas.microsoft.com/office/drawing/2010/main" Requires="a14">
+      <mc:AlternateContent xmlns:mc="http://schemas.openxmlformats.org/markup-compatibility/2006" xmlns:a14="http://schemas.microsoft.com/office/drawing/2010/main">
+        <mc:Choice Requires="a14">
           <p:sp>
             <p:nvSpPr>
               <p:cNvPr id="5" name="TextBox 4">
@@ -7367,7 +5938,7 @@
             </p:txBody>
           </p:sp>
         </mc:Choice>
-        <mc:Fallback>
+        <mc:Fallback xmlns="">
           <p:sp>
             <p:nvSpPr>
               <p:cNvPr id="5" name="TextBox 4">
@@ -7412,8 +5983,8 @@
           </p:sp>
         </mc:Fallback>
       </mc:AlternateContent>
-      <mc:AlternateContent xmlns:mc="http://schemas.openxmlformats.org/markup-compatibility/2006">
-        <mc:Choice xmlns:a14="http://schemas.microsoft.com/office/drawing/2010/main" Requires="a14">
+      <mc:AlternateContent xmlns:mc="http://schemas.openxmlformats.org/markup-compatibility/2006" xmlns:a14="http://schemas.microsoft.com/office/drawing/2010/main">
+        <mc:Choice Requires="a14">
           <p:sp>
             <p:nvSpPr>
               <p:cNvPr id="6" name="TextBox 5">
@@ -7538,7 +6109,7 @@
             </p:txBody>
           </p:sp>
         </mc:Choice>
-        <mc:Fallback>
+        <mc:Fallback xmlns="">
           <p:sp>
             <p:nvSpPr>
               <p:cNvPr id="6" name="TextBox 5">
@@ -7596,7 +6167,7 @@
 </p:sld>
 </file>
 
-<file path=ppt/slides/slide12.xml><?xml version="1.0" encoding="utf-8"?>
+<file path=ppt/slides/slide11.xml><?xml version="1.0" encoding="utf-8"?>
 <p:sld xmlns:a="http://schemas.openxmlformats.org/drawingml/2006/main" xmlns:r="http://schemas.openxmlformats.org/officeDocument/2006/relationships" xmlns:p="http://schemas.openxmlformats.org/presentationml/2006/main">
   <p:cSld>
     <p:spTree>
@@ -7648,8 +6219,8 @@
           </a:p>
         </p:txBody>
       </p:sp>
-      <mc:AlternateContent xmlns:mc="http://schemas.openxmlformats.org/markup-compatibility/2006">
-        <mc:Choice xmlns:a14="http://schemas.microsoft.com/office/drawing/2010/main" Requires="a14">
+      <mc:AlternateContent xmlns:mc="http://schemas.openxmlformats.org/markup-compatibility/2006" xmlns:a14="http://schemas.microsoft.com/office/drawing/2010/main">
+        <mc:Choice Requires="a14">
           <p:sp>
             <p:nvSpPr>
               <p:cNvPr id="4" name="Content Placeholder 3">
@@ -8342,7 +6913,7 @@
             </p:txBody>
           </p:sp>
         </mc:Choice>
-        <mc:Fallback>
+        <mc:Fallback xmlns="">
           <p:sp>
             <p:nvSpPr>
               <p:cNvPr id="4" name="Content Placeholder 3">
@@ -8415,7 +6986,7 @@
               <a:pPr>
                 <a:defRPr/>
               </a:pPr>
-              <a:t>12</a:t>
+              <a:t>11</a:t>
             </a:fld>
             <a:endParaRPr lang="en-US" altLang="x-none"/>
           </a:p>
@@ -8434,7 +7005,7 @@
 </p:sld>
 </file>
 
-<file path=ppt/slides/slide13.xml><?xml version="1.0" encoding="utf-8"?>
+<file path=ppt/slides/slide12.xml><?xml version="1.0" encoding="utf-8"?>
 <p:sld xmlns:a="http://schemas.openxmlformats.org/drawingml/2006/main" xmlns:r="http://schemas.openxmlformats.org/officeDocument/2006/relationships" xmlns:p="http://schemas.openxmlformats.org/presentationml/2006/main">
   <p:cSld>
     <p:spTree>
@@ -8508,7 +7079,7 @@
               <a:pPr>
                 <a:defRPr/>
               </a:pPr>
-              <a:t>13</a:t>
+              <a:t>12</a:t>
             </a:fld>
             <a:endParaRPr lang="en-US" altLang="x-none"/>
           </a:p>
@@ -8829,7 +7400,7 @@
 </p:sld>
 </file>
 
-<file path=ppt/slides/slide14.xml><?xml version="1.0" encoding="utf-8"?>
+<file path=ppt/slides/slide13.xml><?xml version="1.0" encoding="utf-8"?>
 <p:sld xmlns:a="http://schemas.openxmlformats.org/drawingml/2006/main" xmlns:r="http://schemas.openxmlformats.org/officeDocument/2006/relationships" xmlns:p="http://schemas.openxmlformats.org/presentationml/2006/main">
   <p:cSld>
     <p:spTree>
@@ -8875,7 +7446,7 @@
               <a:pPr>
                 <a:defRPr/>
               </a:pPr>
-              <a:t>14</a:t>
+              <a:t>13</a:t>
             </a:fld>
             <a:endParaRPr lang="en-US" altLang="x-none"/>
           </a:p>
@@ -8941,8 +7512,8 @@
           </a:prstGeom>
         </p:spPr>
       </p:pic>
-      <mc:AlternateContent xmlns:mc="http://schemas.openxmlformats.org/markup-compatibility/2006">
-        <mc:Choice xmlns:a14="http://schemas.microsoft.com/office/drawing/2010/main" Requires="a14">
+      <mc:AlternateContent xmlns:mc="http://schemas.openxmlformats.org/markup-compatibility/2006" xmlns:a14="http://schemas.microsoft.com/office/drawing/2010/main">
+        <mc:Choice Requires="a14">
           <p:sp>
             <p:nvSpPr>
               <p:cNvPr id="4" name="TextBox 3">
@@ -8971,6 +7542,7 @@
               </a:bodyPr>
               <a:lstStyle/>
               <a:p>
+                <a:pPr/>
                 <a14:m>
                   <m:oMathPara xmlns:m="http://schemas.openxmlformats.org/officeDocument/2006/math">
                     <m:oMathParaPr>
@@ -9016,7 +7588,7 @@
             </p:txBody>
           </p:sp>
         </mc:Choice>
-        <mc:Fallback>
+        <mc:Fallback xmlns="">
           <p:sp>
             <p:nvSpPr>
               <p:cNvPr id="4" name="TextBox 3">
@@ -9657,7 +8229,7 @@
 </p:sld>
 </file>
 
-<file path=ppt/slides/slide15.xml><?xml version="1.0" encoding="utf-8"?>
+<file path=ppt/slides/slide14.xml><?xml version="1.0" encoding="utf-8"?>
 <p:sld xmlns:a="http://schemas.openxmlformats.org/drawingml/2006/main" xmlns:r="http://schemas.openxmlformats.org/officeDocument/2006/relationships" xmlns:p="http://schemas.openxmlformats.org/presentationml/2006/main">
   <p:cSld>
     <p:spTree>
@@ -9738,7 +8310,7 @@
               <a:pPr>
                 <a:defRPr/>
               </a:pPr>
-              <a:t>15</a:t>
+              <a:t>14</a:t>
             </a:fld>
             <a:endParaRPr lang="en-US" altLang="x-none"/>
           </a:p>
@@ -10140,7 +8712,7 @@
 </p:sld>
 </file>
 
-<file path=ppt/slides/slide16.xml><?xml version="1.0" encoding="utf-8"?>
+<file path=ppt/slides/slide15.xml><?xml version="1.0" encoding="utf-8"?>
 <p:sld xmlns:a="http://schemas.openxmlformats.org/drawingml/2006/main" xmlns:r="http://schemas.openxmlformats.org/officeDocument/2006/relationships" xmlns:p="http://schemas.openxmlformats.org/presentationml/2006/main">
   <p:cSld>
     <p:spTree>
@@ -10221,7 +8793,7 @@
               <a:pPr>
                 <a:defRPr/>
               </a:pPr>
-              <a:t>16</a:t>
+              <a:t>15</a:t>
             </a:fld>
             <a:endParaRPr lang="en-US" altLang="x-none"/>
           </a:p>
@@ -10634,7 +9206,7 @@
 </p:sld>
 </file>
 
-<file path=ppt/slides/slide17.xml><?xml version="1.0" encoding="utf-8"?>
+<file path=ppt/slides/slide16.xml><?xml version="1.0" encoding="utf-8"?>
 <p:sld xmlns:a="http://schemas.openxmlformats.org/drawingml/2006/main" xmlns:r="http://schemas.openxmlformats.org/officeDocument/2006/relationships" xmlns:p="http://schemas.openxmlformats.org/presentationml/2006/main">
   <p:cSld>
     <p:spTree>
@@ -10708,14 +9280,14 @@
               <a:pPr>
                 <a:defRPr/>
               </a:pPr>
-              <a:t>17</a:t>
+              <a:t>16</a:t>
             </a:fld>
             <a:endParaRPr lang="en-US" altLang="x-none"/>
           </a:p>
         </p:txBody>
       </p:sp>
-      <mc:AlternateContent xmlns:mc="http://schemas.openxmlformats.org/markup-compatibility/2006">
-        <mc:Choice xmlns:a14="http://schemas.microsoft.com/office/drawing/2010/main" Requires="a14">
+      <mc:AlternateContent xmlns:mc="http://schemas.openxmlformats.org/markup-compatibility/2006" xmlns:a14="http://schemas.microsoft.com/office/drawing/2010/main">
+        <mc:Choice Requires="a14">
           <p:sp>
             <p:nvSpPr>
               <p:cNvPr id="4" name="TextBox 3">
@@ -11188,7 +9760,7 @@
             </p:txBody>
           </p:sp>
         </mc:Choice>
-        <mc:Fallback>
+        <mc:Fallback xmlns="">
           <p:sp>
             <p:nvSpPr>
               <p:cNvPr id="4" name="TextBox 3">
@@ -11233,8 +9805,8 @@
           </p:sp>
         </mc:Fallback>
       </mc:AlternateContent>
-      <mc:AlternateContent xmlns:mc="http://schemas.openxmlformats.org/markup-compatibility/2006">
-        <mc:Choice xmlns:a14="http://schemas.microsoft.com/office/drawing/2010/main" Requires="a14">
+      <mc:AlternateContent xmlns:mc="http://schemas.openxmlformats.org/markup-compatibility/2006" xmlns:a14="http://schemas.microsoft.com/office/drawing/2010/main">
+        <mc:Choice Requires="a14">
           <p:sp>
             <p:nvSpPr>
               <p:cNvPr id="5" name="TextBox 4">
@@ -11350,7 +9922,7 @@
             </p:txBody>
           </p:sp>
         </mc:Choice>
-        <mc:Fallback>
+        <mc:Fallback xmlns="">
           <p:sp>
             <p:nvSpPr>
               <p:cNvPr id="5" name="TextBox 4">
@@ -11395,8 +9967,8 @@
           </p:sp>
         </mc:Fallback>
       </mc:AlternateContent>
-      <mc:AlternateContent xmlns:mc="http://schemas.openxmlformats.org/markup-compatibility/2006">
-        <mc:Choice xmlns:a14="http://schemas.microsoft.com/office/drawing/2010/main" Requires="a14">
+      <mc:AlternateContent xmlns:mc="http://schemas.openxmlformats.org/markup-compatibility/2006" xmlns:a14="http://schemas.microsoft.com/office/drawing/2010/main">
+        <mc:Choice Requires="a14">
           <p:sp>
             <p:nvSpPr>
               <p:cNvPr id="6" name="TextBox 5">
@@ -11503,7 +10075,7 @@
             </p:txBody>
           </p:sp>
         </mc:Choice>
-        <mc:Fallback>
+        <mc:Fallback xmlns="">
           <p:sp>
             <p:nvSpPr>
               <p:cNvPr id="6" name="TextBox 5">
@@ -11561,7 +10133,7 @@
 </p:sld>
 </file>
 
-<file path=ppt/slides/slide18.xml><?xml version="1.0" encoding="utf-8"?>
+<file path=ppt/slides/slide17.xml><?xml version="1.0" encoding="utf-8"?>
 <p:sld xmlns:a="http://schemas.openxmlformats.org/drawingml/2006/main" xmlns:r="http://schemas.openxmlformats.org/officeDocument/2006/relationships" xmlns:p="http://schemas.openxmlformats.org/presentationml/2006/main">
   <p:cSld>
     <p:spTree>
@@ -11578,8 +10150,8 @@
           <a:chExt cx="0" cy="0"/>
         </a:xfrm>
       </p:grpSpPr>
-      <mc:AlternateContent xmlns:mc="http://schemas.openxmlformats.org/markup-compatibility/2006">
-        <mc:Choice xmlns:a14="http://schemas.microsoft.com/office/drawing/2010/main" Requires="a14">
+      <mc:AlternateContent xmlns:mc="http://schemas.openxmlformats.org/markup-compatibility/2006" xmlns:a14="http://schemas.microsoft.com/office/drawing/2010/main">
+        <mc:Choice Requires="a14">
           <p:sp>
             <p:nvSpPr>
               <p:cNvPr id="2" name="Title 1">
@@ -11632,7 +10204,7 @@
             </p:txBody>
           </p:sp>
         </mc:Choice>
-        <mc:Fallback>
+        <mc:Fallback xmlns="">
           <p:sp>
             <p:nvSpPr>
               <p:cNvPr id="2" name="Title 1">
@@ -11701,14 +10273,14 @@
               <a:pPr>
                 <a:defRPr/>
               </a:pPr>
-              <a:t>18</a:t>
+              <a:t>17</a:t>
             </a:fld>
             <a:endParaRPr lang="en-US" altLang="x-none"/>
           </a:p>
         </p:txBody>
       </p:sp>
-      <mc:AlternateContent xmlns:mc="http://schemas.openxmlformats.org/markup-compatibility/2006">
-        <mc:Choice xmlns:a14="http://schemas.microsoft.com/office/drawing/2010/main" Requires="a14">
+      <mc:AlternateContent xmlns:mc="http://schemas.openxmlformats.org/markup-compatibility/2006" xmlns:a14="http://schemas.microsoft.com/office/drawing/2010/main">
+        <mc:Choice Requires="a14">
           <p:sp>
             <p:nvSpPr>
               <p:cNvPr id="5" name="TextBox 4">
@@ -11824,7 +10396,7 @@
             </p:txBody>
           </p:sp>
         </mc:Choice>
-        <mc:Fallback>
+        <mc:Fallback xmlns="">
           <p:sp>
             <p:nvSpPr>
               <p:cNvPr id="5" name="TextBox 4">
@@ -11869,8 +10441,8 @@
           </p:sp>
         </mc:Fallback>
       </mc:AlternateContent>
-      <mc:AlternateContent xmlns:mc="http://schemas.openxmlformats.org/markup-compatibility/2006">
-        <mc:Choice xmlns:a14="http://schemas.microsoft.com/office/drawing/2010/main" Requires="a14">
+      <mc:AlternateContent xmlns:mc="http://schemas.openxmlformats.org/markup-compatibility/2006" xmlns:a14="http://schemas.microsoft.com/office/drawing/2010/main">
+        <mc:Choice Requires="a14">
           <p:sp>
             <p:nvSpPr>
               <p:cNvPr id="6" name="TextBox 5">
@@ -12040,7 +10612,7 @@
                     <m:d>
                       <m:dPr>
                         <m:ctrlPr>
-                          <a:rPr lang="en-US" sz="2400" b="0" i="0" smtClean="0">
+                          <a:rPr lang="en-US" sz="2400" b="0" i="1" smtClean="0">
                             <a:latin typeface="Cambria Math" panose="02040503050406030204" pitchFamily="18" charset="0"/>
                           </a:rPr>
                         </m:ctrlPr>
@@ -12177,7 +10749,7 @@
             </p:txBody>
           </p:sp>
         </mc:Choice>
-        <mc:Fallback>
+        <mc:Fallback xmlns="">
           <p:sp>
             <p:nvSpPr>
               <p:cNvPr id="6" name="TextBox 5">
@@ -12235,7 +10807,7 @@
 </p:sld>
 </file>
 
-<file path=ppt/slides/slide19.xml><?xml version="1.0" encoding="utf-8"?>
+<file path=ppt/slides/slide18.xml><?xml version="1.0" encoding="utf-8"?>
 <p:sld xmlns:a="http://schemas.openxmlformats.org/drawingml/2006/main" xmlns:r="http://schemas.openxmlformats.org/officeDocument/2006/relationships" xmlns:p="http://schemas.openxmlformats.org/presentationml/2006/main">
   <p:cSld>
     <p:spTree>
@@ -12309,7 +10881,7 @@
               <a:pPr>
                 <a:defRPr/>
               </a:pPr>
-              <a:t>19</a:t>
+              <a:t>18</a:t>
             </a:fld>
             <a:endParaRPr lang="en-US" altLang="x-none"/>
           </a:p>
@@ -12444,6 +11016,99 @@
 </p:sld>
 </file>
 
+<file path=ppt/slides/slide19.xml><?xml version="1.0" encoding="utf-8"?>
+<p:sld xmlns:a="http://schemas.openxmlformats.org/drawingml/2006/main" xmlns:r="http://schemas.openxmlformats.org/officeDocument/2006/relationships" xmlns:p="http://schemas.openxmlformats.org/presentationml/2006/main">
+  <p:cSld>
+    <p:spTree>
+      <p:nvGrpSpPr>
+        <p:cNvPr id="1" name=""/>
+        <p:cNvGrpSpPr/>
+        <p:nvPr/>
+      </p:nvGrpSpPr>
+      <p:grpSpPr>
+        <a:xfrm>
+          <a:off x="0" y="0"/>
+          <a:ext cx="0" cy="0"/>
+          <a:chOff x="0" y="0"/>
+          <a:chExt cx="0" cy="0"/>
+        </a:xfrm>
+      </p:grpSpPr>
+      <p:sp>
+        <p:nvSpPr>
+          <p:cNvPr id="2" name="Title 1">
+            <a:extLst>
+              <a:ext uri="{FF2B5EF4-FFF2-40B4-BE49-F238E27FC236}">
+                <a16:creationId xmlns:a16="http://schemas.microsoft.com/office/drawing/2014/main" id="{64ED43B8-6117-D146-9C75-8A48185C601B}"/>
+              </a:ext>
+            </a:extLst>
+          </p:cNvPr>
+          <p:cNvSpPr>
+            <a:spLocks noGrp="1"/>
+          </p:cNvSpPr>
+          <p:nvPr>
+            <p:ph type="title"/>
+          </p:nvPr>
+        </p:nvSpPr>
+        <p:spPr/>
+        <p:txBody>
+          <a:bodyPr/>
+          <a:lstStyle/>
+          <a:p>
+            <a:r>
+              <a:rPr lang="en-US" dirty="0"/>
+              <a:t>Chi Square Test</a:t>
+            </a:r>
+          </a:p>
+        </p:txBody>
+      </p:sp>
+      <p:sp>
+        <p:nvSpPr>
+          <p:cNvPr id="3" name="Slide Number Placeholder 2">
+            <a:extLst>
+              <a:ext uri="{FF2B5EF4-FFF2-40B4-BE49-F238E27FC236}">
+                <a16:creationId xmlns:a16="http://schemas.microsoft.com/office/drawing/2014/main" id="{AF75DEAB-4E3C-B041-9714-62A008D47924}"/>
+              </a:ext>
+            </a:extLst>
+          </p:cNvPr>
+          <p:cNvSpPr>
+            <a:spLocks noGrp="1"/>
+          </p:cNvSpPr>
+          <p:nvPr>
+            <p:ph type="sldNum" sz="quarter" idx="11"/>
+          </p:nvPr>
+        </p:nvSpPr>
+        <p:spPr/>
+        <p:txBody>
+          <a:bodyPr/>
+          <a:lstStyle/>
+          <a:p>
+            <a:pPr>
+              <a:defRPr/>
+            </a:pPr>
+            <a:fld id="{2E4304A7-0FB2-4094-BC1E-DB17183AD0C1}" type="slidenum">
+              <a:rPr lang="en-US" altLang="x-none" smtClean="0"/>
+              <a:pPr>
+                <a:defRPr/>
+              </a:pPr>
+              <a:t>19</a:t>
+            </a:fld>
+            <a:endParaRPr lang="en-US" altLang="x-none"/>
+          </a:p>
+        </p:txBody>
+      </p:sp>
+    </p:spTree>
+    <p:extLst>
+      <p:ext uri="{BB962C8B-B14F-4D97-AF65-F5344CB8AC3E}">
+        <p14:creationId xmlns:p14="http://schemas.microsoft.com/office/powerpoint/2010/main" val="384245112"/>
+      </p:ext>
+    </p:extLst>
+  </p:cSld>
+  <p:clrMapOvr>
+    <a:masterClrMapping/>
+  </p:clrMapOvr>
+</p:sld>
+</file>
+
 <file path=ppt/slides/slide2.xml><?xml version="1.0" encoding="utf-8"?>
 <p:sld xmlns:a="http://schemas.openxmlformats.org/drawingml/2006/main" xmlns:r="http://schemas.openxmlformats.org/officeDocument/2006/relationships" xmlns:p="http://schemas.openxmlformats.org/presentationml/2006/main">
   <p:cSld>
@@ -12580,323 +11245,7 @@
 </p:sld>
 </file>
 
-<file path=ppt/slides/slide20.xml><?xml version="1.0" encoding="utf-8"?>
-<p:sld xmlns:a="http://schemas.openxmlformats.org/drawingml/2006/main" xmlns:r="http://schemas.openxmlformats.org/officeDocument/2006/relationships" xmlns:p="http://schemas.openxmlformats.org/presentationml/2006/main">
-  <p:cSld>
-    <p:spTree>
-      <p:nvGrpSpPr>
-        <p:cNvPr id="1" name=""/>
-        <p:cNvGrpSpPr/>
-        <p:nvPr/>
-      </p:nvGrpSpPr>
-      <p:grpSpPr>
-        <a:xfrm>
-          <a:off x="0" y="0"/>
-          <a:ext cx="0" cy="0"/>
-          <a:chOff x="0" y="0"/>
-          <a:chExt cx="0" cy="0"/>
-        </a:xfrm>
-      </p:grpSpPr>
-      <p:sp>
-        <p:nvSpPr>
-          <p:cNvPr id="2" name="Title 1">
-            <a:extLst>
-              <a:ext uri="{FF2B5EF4-FFF2-40B4-BE49-F238E27FC236}">
-                <a16:creationId xmlns:a16="http://schemas.microsoft.com/office/drawing/2014/main" id="{64ED43B8-6117-D146-9C75-8A48185C601B}"/>
-              </a:ext>
-            </a:extLst>
-          </p:cNvPr>
-          <p:cNvSpPr>
-            <a:spLocks noGrp="1"/>
-          </p:cNvSpPr>
-          <p:nvPr>
-            <p:ph type="title"/>
-          </p:nvPr>
-        </p:nvSpPr>
-        <p:spPr/>
-        <p:txBody>
-          <a:bodyPr/>
-          <a:lstStyle/>
-          <a:p>
-            <a:r>
-              <a:rPr lang="en-US" dirty="0"/>
-              <a:t>Chi Square Test</a:t>
-            </a:r>
-          </a:p>
-        </p:txBody>
-      </p:sp>
-      <p:sp>
-        <p:nvSpPr>
-          <p:cNvPr id="3" name="Slide Number Placeholder 2">
-            <a:extLst>
-              <a:ext uri="{FF2B5EF4-FFF2-40B4-BE49-F238E27FC236}">
-                <a16:creationId xmlns:a16="http://schemas.microsoft.com/office/drawing/2014/main" id="{AF75DEAB-4E3C-B041-9714-62A008D47924}"/>
-              </a:ext>
-            </a:extLst>
-          </p:cNvPr>
-          <p:cNvSpPr>
-            <a:spLocks noGrp="1"/>
-          </p:cNvSpPr>
-          <p:nvPr>
-            <p:ph type="sldNum" sz="quarter" idx="11"/>
-          </p:nvPr>
-        </p:nvSpPr>
-        <p:spPr/>
-        <p:txBody>
-          <a:bodyPr/>
-          <a:lstStyle/>
-          <a:p>
-            <a:pPr>
-              <a:defRPr/>
-            </a:pPr>
-            <a:fld id="{2E4304A7-0FB2-4094-BC1E-DB17183AD0C1}" type="slidenum">
-              <a:rPr lang="en-US" altLang="x-none" smtClean="0"/>
-              <a:pPr>
-                <a:defRPr/>
-              </a:pPr>
-              <a:t>20</a:t>
-            </a:fld>
-            <a:endParaRPr lang="en-US" altLang="x-none"/>
-          </a:p>
-        </p:txBody>
-      </p:sp>
-    </p:spTree>
-    <p:extLst>
-      <p:ext uri="{BB962C8B-B14F-4D97-AF65-F5344CB8AC3E}">
-        <p14:creationId xmlns:p14="http://schemas.microsoft.com/office/powerpoint/2010/main" val="384245112"/>
-      </p:ext>
-    </p:extLst>
-  </p:cSld>
-  <p:clrMapOvr>
-    <a:masterClrMapping/>
-  </p:clrMapOvr>
-</p:sld>
-</file>
-
 <file path=ppt/slides/slide3.xml><?xml version="1.0" encoding="utf-8"?>
-<p:sld xmlns:a="http://schemas.openxmlformats.org/drawingml/2006/main" xmlns:r="http://schemas.openxmlformats.org/officeDocument/2006/relationships" xmlns:p="http://schemas.openxmlformats.org/presentationml/2006/main">
-  <p:cSld>
-    <p:spTree>
-      <p:nvGrpSpPr>
-        <p:cNvPr id="1" name=""/>
-        <p:cNvGrpSpPr/>
-        <p:nvPr/>
-      </p:nvGrpSpPr>
-      <p:grpSpPr>
-        <a:xfrm>
-          <a:off x="0" y="0"/>
-          <a:ext cx="0" cy="0"/>
-          <a:chOff x="0" y="0"/>
-          <a:chExt cx="0" cy="0"/>
-        </a:xfrm>
-      </p:grpSpPr>
-      <p:sp>
-        <p:nvSpPr>
-          <p:cNvPr id="2" name="Title 1">
-            <a:extLst>
-              <a:ext uri="{FF2B5EF4-FFF2-40B4-BE49-F238E27FC236}">
-                <a16:creationId xmlns:a16="http://schemas.microsoft.com/office/drawing/2014/main" id="{AA9931C9-53C0-3E4B-B070-2B97952A06BB}"/>
-              </a:ext>
-            </a:extLst>
-          </p:cNvPr>
-          <p:cNvSpPr>
-            <a:spLocks noGrp="1"/>
-          </p:cNvSpPr>
-          <p:nvPr>
-            <p:ph type="title"/>
-          </p:nvPr>
-        </p:nvSpPr>
-        <p:spPr/>
-        <p:txBody>
-          <a:bodyPr/>
-          <a:lstStyle/>
-          <a:p>
-            <a:r>
-              <a:rPr lang="en-US" dirty="0"/>
-              <a:t>Notes</a:t>
-            </a:r>
-          </a:p>
-        </p:txBody>
-      </p:sp>
-      <p:sp>
-        <p:nvSpPr>
-          <p:cNvPr id="3" name="Content Placeholder 2">
-            <a:extLst>
-              <a:ext uri="{FF2B5EF4-FFF2-40B4-BE49-F238E27FC236}">
-                <a16:creationId xmlns:a16="http://schemas.microsoft.com/office/drawing/2014/main" id="{74C3A181-11CB-8B4F-9798-E1A306EC3FD1}"/>
-              </a:ext>
-            </a:extLst>
-          </p:cNvPr>
-          <p:cNvSpPr>
-            <a:spLocks noGrp="1"/>
-          </p:cNvSpPr>
-          <p:nvPr>
-            <p:ph idx="1"/>
-          </p:nvPr>
-        </p:nvSpPr>
-        <p:spPr/>
-        <p:txBody>
-          <a:bodyPr/>
-          <a:lstStyle/>
-          <a:p>
-            <a:r>
-              <a:rPr lang="en-US" sz="2000" dirty="0"/>
-              <a:t>Residuals</a:t>
-            </a:r>
-          </a:p>
-          <a:p>
-            <a:pPr lvl="1"/>
-            <a:r>
-              <a:rPr lang="en-US" sz="1600" dirty="0" err="1"/>
-              <a:t>Defn</a:t>
-            </a:r>
-            <a:r>
-              <a:rPr lang="en-US" sz="1600" dirty="0"/>
-              <a:t>, indicators of model issues, functional vs. stochastic error</a:t>
-            </a:r>
-          </a:p>
-          <a:p>
-            <a:pPr lvl="1"/>
-            <a:r>
-              <a:rPr lang="en-US" sz="1600" dirty="0"/>
-              <a:t>Standardized residuals</a:t>
-            </a:r>
-          </a:p>
-          <a:p>
-            <a:pPr lvl="1"/>
-            <a:r>
-              <a:rPr lang="en-US" sz="1600" dirty="0"/>
-              <a:t>Evaluation of residuals: R2, Chi </a:t>
-            </a:r>
-            <a:r>
-              <a:rPr lang="en-US" sz="1600" dirty="0" err="1"/>
-              <a:t>Sq</a:t>
-            </a:r>
-            <a:endParaRPr lang="en-US" sz="1600" dirty="0"/>
-          </a:p>
-          <a:p>
-            <a:r>
-              <a:rPr lang="en-US" sz="2000" dirty="0"/>
-              <a:t>Hypothesis testing</a:t>
-            </a:r>
-          </a:p>
-          <a:p>
-            <a:r>
-              <a:rPr lang="en-US" sz="2000" dirty="0"/>
-              <a:t>Comparing models</a:t>
-            </a:r>
-          </a:p>
-          <a:p>
-            <a:pPr lvl="1"/>
-            <a:r>
-              <a:rPr lang="en-US" sz="1600" dirty="0"/>
-              <a:t>Overfitting, assessing parameter complexity</a:t>
-            </a:r>
-          </a:p>
-          <a:p>
-            <a:pPr lvl="1"/>
-            <a:r>
-              <a:rPr lang="en-US" sz="1600" dirty="0"/>
-              <a:t>Errors in data get propagated</a:t>
-            </a:r>
-          </a:p>
-          <a:p>
-            <a:pPr lvl="1"/>
-            <a:r>
-              <a:rPr lang="en-US" sz="1600" dirty="0"/>
-              <a:t>Model is correct vs. model fits</a:t>
-            </a:r>
-          </a:p>
-          <a:p>
-            <a:r>
-              <a:rPr lang="en-US" sz="2000" dirty="0"/>
-              <a:t>Confidence intervals</a:t>
-            </a:r>
-          </a:p>
-          <a:p>
-            <a:pPr lvl="1"/>
-            <a:r>
-              <a:rPr lang="en-US" sz="1600" dirty="0"/>
-              <a:t>Definition</a:t>
-            </a:r>
-          </a:p>
-          <a:p>
-            <a:pPr lvl="1"/>
-            <a:r>
-              <a:rPr lang="en-US" sz="1600" dirty="0"/>
-              <a:t>Estimation techniques: Hessian, simulation, bootstrapping</a:t>
-            </a:r>
-          </a:p>
-          <a:p>
-            <a:r>
-              <a:rPr lang="en-US" sz="2000" dirty="0"/>
-              <a:t>Assessing model quality: cross-validation</a:t>
-            </a:r>
-          </a:p>
-          <a:p>
-            <a:r>
-              <a:rPr lang="en-US" sz="2000" dirty="0"/>
-              <a:t>In class exercise: Enzyme Kinetics</a:t>
-            </a:r>
-          </a:p>
-          <a:p>
-            <a:pPr lvl="1"/>
-            <a:r>
-              <a:rPr lang="en-US" sz="1600" dirty="0"/>
-              <a:t>Problem with correlated parameter values</a:t>
-            </a:r>
-          </a:p>
-        </p:txBody>
-      </p:sp>
-      <p:sp>
-        <p:nvSpPr>
-          <p:cNvPr id="4" name="Slide Number Placeholder 3">
-            <a:extLst>
-              <a:ext uri="{FF2B5EF4-FFF2-40B4-BE49-F238E27FC236}">
-                <a16:creationId xmlns:a16="http://schemas.microsoft.com/office/drawing/2014/main" id="{80C08DFD-0B14-294A-9B6E-DDE41EC79D10}"/>
-              </a:ext>
-            </a:extLst>
-          </p:cNvPr>
-          <p:cNvSpPr>
-            <a:spLocks noGrp="1"/>
-          </p:cNvSpPr>
-          <p:nvPr>
-            <p:ph type="sldNum" sz="quarter" idx="11"/>
-          </p:nvPr>
-        </p:nvSpPr>
-        <p:spPr/>
-        <p:txBody>
-          <a:bodyPr/>
-          <a:lstStyle/>
-          <a:p>
-            <a:pPr>
-              <a:defRPr/>
-            </a:pPr>
-            <a:fld id="{3EF4E9CC-9D91-476E-91FD-5BEEC1642931}" type="slidenum">
-              <a:rPr lang="en-US" altLang="x-none" smtClean="0"/>
-              <a:pPr>
-                <a:defRPr/>
-              </a:pPr>
-              <a:t>3</a:t>
-            </a:fld>
-            <a:endParaRPr lang="en-US" altLang="x-none"/>
-          </a:p>
-        </p:txBody>
-      </p:sp>
-    </p:spTree>
-    <p:extLst>
-      <p:ext uri="{BB962C8B-B14F-4D97-AF65-F5344CB8AC3E}">
-        <p14:creationId xmlns:p14="http://schemas.microsoft.com/office/powerpoint/2010/main" val="4095691780"/>
-      </p:ext>
-    </p:extLst>
-  </p:cSld>
-  <p:clrMapOvr>
-    <a:masterClrMapping/>
-  </p:clrMapOvr>
-</p:sld>
-</file>
-
-<file path=ppt/slides/slide4.xml><?xml version="1.0" encoding="utf-8"?>
 <p:sld xmlns:a="http://schemas.openxmlformats.org/drawingml/2006/main" xmlns:r="http://schemas.openxmlformats.org/officeDocument/2006/relationships" xmlns:p="http://schemas.openxmlformats.org/presentationml/2006/main">
   <p:cSld>
     <p:spTree>
@@ -12970,7 +11319,7 @@
               <a:pPr>
                 <a:defRPr/>
               </a:pPr>
-              <a:t>4</a:t>
+              <a:t>3</a:t>
             </a:fld>
             <a:endParaRPr lang="en-US" altLang="x-none"/>
           </a:p>
@@ -13743,7 +12092,7 @@
 </p:sld>
 </file>
 
-<file path=ppt/slides/slide5.xml><?xml version="1.0" encoding="utf-8"?>
+<file path=ppt/slides/slide4.xml><?xml version="1.0" encoding="utf-8"?>
 <p:sld xmlns:a="http://schemas.openxmlformats.org/drawingml/2006/main" xmlns:r="http://schemas.openxmlformats.org/officeDocument/2006/relationships" xmlns:p="http://schemas.openxmlformats.org/presentationml/2006/main">
   <p:cSld>
     <p:spTree>
@@ -13822,7 +12171,7 @@
               <a:pPr>
                 <a:defRPr/>
               </a:pPr>
-              <a:t>5</a:t>
+              <a:t>4</a:t>
             </a:fld>
             <a:endParaRPr lang="en-US" altLang="x-none"/>
           </a:p>
@@ -14305,7 +12654,7 @@
 </p:sld>
 </file>
 
-<file path=ppt/slides/slide6.xml><?xml version="1.0" encoding="utf-8"?>
+<file path=ppt/slides/slide5.xml><?xml version="1.0" encoding="utf-8"?>
 <p:sld xmlns:a="http://schemas.openxmlformats.org/drawingml/2006/main" xmlns:r="http://schemas.openxmlformats.org/officeDocument/2006/relationships" xmlns:p="http://schemas.openxmlformats.org/presentationml/2006/main">
   <p:cSld>
     <p:spTree>
@@ -14424,7 +12773,7 @@
               <a:pPr>
                 <a:defRPr/>
               </a:pPr>
-              <a:t>6</a:t>
+              <a:t>5</a:t>
             </a:fld>
             <a:endParaRPr lang="en-US" altLang="x-none"/>
           </a:p>
@@ -15309,7 +13658,7 @@
 </p:sld>
 </file>
 
-<file path=ppt/slides/slide7.xml><?xml version="1.0" encoding="utf-8"?>
+<file path=ppt/slides/slide6.xml><?xml version="1.0" encoding="utf-8"?>
 <p:sld xmlns:a="http://schemas.openxmlformats.org/drawingml/2006/main" xmlns:r="http://schemas.openxmlformats.org/officeDocument/2006/relationships" xmlns:p="http://schemas.openxmlformats.org/presentationml/2006/main">
   <p:cSld>
     <p:spTree>
@@ -15388,7 +13737,7 @@
               <a:pPr>
                 <a:defRPr/>
               </a:pPr>
-              <a:t>7</a:t>
+              <a:t>6</a:t>
             </a:fld>
             <a:endParaRPr lang="en-US" altLang="x-none"/>
           </a:p>
@@ -15709,7 +14058,7 @@
 </p:sld>
 </file>
 
-<file path=ppt/slides/slide8.xml><?xml version="1.0" encoding="utf-8"?>
+<file path=ppt/slides/slide7.xml><?xml version="1.0" encoding="utf-8"?>
 <p:sld xmlns:a="http://schemas.openxmlformats.org/drawingml/2006/main" xmlns:r="http://schemas.openxmlformats.org/officeDocument/2006/relationships" xmlns:p="http://schemas.openxmlformats.org/presentationml/2006/main">
   <p:cSld>
     <p:spTree>
@@ -15783,7 +14132,7 @@
               <a:pPr>
                 <a:defRPr/>
               </a:pPr>
-              <a:t>8</a:t>
+              <a:t>7</a:t>
             </a:fld>
             <a:endParaRPr lang="en-US" altLang="x-none"/>
           </a:p>
@@ -16016,7 +14365,7 @@
 </p:sld>
 </file>
 
-<file path=ppt/slides/slide9.xml><?xml version="1.0" encoding="utf-8"?>
+<file path=ppt/slides/slide8.xml><?xml version="1.0" encoding="utf-8"?>
 <p:sld xmlns:a="http://schemas.openxmlformats.org/drawingml/2006/main" xmlns:r="http://schemas.openxmlformats.org/officeDocument/2006/relationships" xmlns:p="http://schemas.openxmlformats.org/presentationml/2006/main">
   <p:cSld>
     <p:spTree>
@@ -16090,7 +14439,7 @@
               <a:pPr>
                 <a:defRPr/>
               </a:pPr>
-              <a:t>9</a:t>
+              <a:t>8</a:t>
             </a:fld>
             <a:endParaRPr lang="en-US" altLang="x-none"/>
           </a:p>
@@ -16643,6 +14992,1435 @@
         </p:cTn>
       </p:par>
     </p:tnLst>
+  </p:timing>
+</p:sld>
+</file>
+
+<file path=ppt/slides/slide9.xml><?xml version="1.0" encoding="utf-8"?>
+<p:sld xmlns:a="http://schemas.openxmlformats.org/drawingml/2006/main" xmlns:r="http://schemas.openxmlformats.org/officeDocument/2006/relationships" xmlns:p="http://schemas.openxmlformats.org/presentationml/2006/main">
+  <p:cSld>
+    <p:spTree>
+      <p:nvGrpSpPr>
+        <p:cNvPr id="1" name=""/>
+        <p:cNvGrpSpPr/>
+        <p:nvPr/>
+      </p:nvGrpSpPr>
+      <p:grpSpPr>
+        <a:xfrm>
+          <a:off x="0" y="0"/>
+          <a:ext cx="0" cy="0"/>
+          <a:chOff x="0" y="0"/>
+          <a:chExt cx="0" cy="0"/>
+        </a:xfrm>
+      </p:grpSpPr>
+      <mc:AlternateContent xmlns:mc="http://schemas.openxmlformats.org/markup-compatibility/2006" xmlns:a14="http://schemas.microsoft.com/office/drawing/2010/main">
+        <mc:Choice Requires="a14">
+          <p:sp>
+            <p:nvSpPr>
+              <p:cNvPr id="2" name="Title 1">
+                <a:extLst>
+                  <a:ext uri="{FF2B5EF4-FFF2-40B4-BE49-F238E27FC236}">
+                    <a16:creationId xmlns:a16="http://schemas.microsoft.com/office/drawing/2014/main" id="{8F25CC62-9A33-B347-96DA-4ACFB99F45D7}"/>
+                  </a:ext>
+                </a:extLst>
+              </p:cNvPr>
+              <p:cNvSpPr>
+                <a:spLocks noGrp="1"/>
+              </p:cNvSpPr>
+              <p:nvPr>
+                <p:ph type="title"/>
+              </p:nvPr>
+            </p:nvSpPr>
+            <p:spPr/>
+            <p:txBody>
+              <a:bodyPr/>
+              <a:lstStyle/>
+              <a:p>
+                <a:r>
+                  <a:rPr lang="en-US" dirty="0"/>
+                  <a:t>Quantifying Model Quality: </a:t>
+                </a:r>
+                <a14:m>
+                  <m:oMath xmlns:m="http://schemas.openxmlformats.org/officeDocument/2006/math">
+                    <m:sSup>
+                      <m:sSupPr>
+                        <m:ctrlPr>
+                          <a:rPr lang="en-US" b="1" i="1" smtClean="0">
+                            <a:latin typeface="Cambria Math" panose="02040503050406030204" pitchFamily="18" charset="0"/>
+                          </a:rPr>
+                        </m:ctrlPr>
+                      </m:sSupPr>
+                      <m:e>
+                        <m:r>
+                          <a:rPr lang="en-US" b="1" i="1" smtClean="0">
+                            <a:latin typeface="Cambria Math" panose="02040503050406030204" pitchFamily="18" charset="0"/>
+                          </a:rPr>
+                          <m:t>𝑹</m:t>
+                        </m:r>
+                      </m:e>
+                      <m:sup>
+                        <m:r>
+                          <a:rPr lang="en-US" b="1" i="1" smtClean="0">
+                            <a:latin typeface="Cambria Math" panose="02040503050406030204" pitchFamily="18" charset="0"/>
+                          </a:rPr>
+                          <m:t>𝟐</m:t>
+                        </m:r>
+                      </m:sup>
+                    </m:sSup>
+                  </m:oMath>
+                </a14:m>
+                <a:endParaRPr lang="en-US" dirty="0"/>
+              </a:p>
+            </p:txBody>
+          </p:sp>
+        </mc:Choice>
+        <mc:Fallback xmlns="">
+          <p:sp>
+            <p:nvSpPr>
+              <p:cNvPr id="2" name="Title 1">
+                <a:extLst>
+                  <a:ext uri="{FF2B5EF4-FFF2-40B4-BE49-F238E27FC236}">
+                    <a16:creationId xmlns:a16="http://schemas.microsoft.com/office/drawing/2014/main" id="{8F25CC62-9A33-B347-96DA-4ACFB99F45D7}"/>
+                  </a:ext>
+                </a:extLst>
+              </p:cNvPr>
+              <p:cNvSpPr>
+                <a:spLocks noGrp="1" noRot="1" noChangeAspect="1" noMove="1" noResize="1" noEditPoints="1" noAdjustHandles="1" noChangeArrowheads="1" noChangeShapeType="1" noTextEdit="1"/>
+              </p:cNvSpPr>
+              <p:nvPr>
+                <p:ph type="title"/>
+              </p:nvPr>
+            </p:nvSpPr>
+            <p:spPr>
+              <a:blipFill>
+                <a:blip r:embed="rId2"/>
+                <a:stretch>
+                  <a:fillRect t="-8955" b="-5970"/>
+                </a:stretch>
+              </a:blipFill>
+            </p:spPr>
+            <p:txBody>
+              <a:bodyPr/>
+              <a:lstStyle/>
+              <a:p>
+                <a:r>
+                  <a:rPr lang="en-US">
+                    <a:noFill/>
+                  </a:rPr>
+                  <a:t> </a:t>
+                </a:r>
+              </a:p>
+            </p:txBody>
+          </p:sp>
+        </mc:Fallback>
+      </mc:AlternateContent>
+      <p:sp>
+        <p:nvSpPr>
+          <p:cNvPr id="3" name="Slide Number Placeholder 2">
+            <a:extLst>
+              <a:ext uri="{FF2B5EF4-FFF2-40B4-BE49-F238E27FC236}">
+                <a16:creationId xmlns:a16="http://schemas.microsoft.com/office/drawing/2014/main" id="{A669C8F2-1590-6F45-9CB2-1572F3279198}"/>
+              </a:ext>
+            </a:extLst>
+          </p:cNvPr>
+          <p:cNvSpPr>
+            <a:spLocks noGrp="1"/>
+          </p:cNvSpPr>
+          <p:nvPr>
+            <p:ph type="sldNum" sz="quarter" idx="11"/>
+          </p:nvPr>
+        </p:nvSpPr>
+        <p:spPr/>
+        <p:txBody>
+          <a:bodyPr/>
+          <a:lstStyle/>
+          <a:p>
+            <a:pPr>
+              <a:defRPr/>
+            </a:pPr>
+            <a:fld id="{2E4304A7-0FB2-4094-BC1E-DB17183AD0C1}" type="slidenum">
+              <a:rPr lang="en-US" altLang="x-none" smtClean="0"/>
+              <a:pPr>
+                <a:defRPr/>
+              </a:pPr>
+              <a:t>9</a:t>
+            </a:fld>
+            <a:endParaRPr lang="en-US" altLang="x-none"/>
+          </a:p>
+        </p:txBody>
+      </p:sp>
+      <p:pic>
+        <p:nvPicPr>
+          <p:cNvPr id="4" name="Picture 3">
+            <a:extLst>
+              <a:ext uri="{FF2B5EF4-FFF2-40B4-BE49-F238E27FC236}">
+                <a16:creationId xmlns:a16="http://schemas.microsoft.com/office/drawing/2014/main" id="{C7D92168-3C78-5E43-9449-B628AADE85CF}"/>
+              </a:ext>
+            </a:extLst>
+          </p:cNvPr>
+          <p:cNvPicPr>
+            <a:picLocks noChangeAspect="1"/>
+          </p:cNvPicPr>
+          <p:nvPr/>
+        </p:nvPicPr>
+        <p:blipFill>
+          <a:blip r:embed="rId3"/>
+          <a:stretch>
+            <a:fillRect/>
+          </a:stretch>
+        </p:blipFill>
+        <p:spPr>
+          <a:xfrm>
+            <a:off x="1527811" y="2239758"/>
+            <a:ext cx="2743200" cy="1904104"/>
+          </a:xfrm>
+          <a:prstGeom prst="rect">
+            <a:avLst/>
+          </a:prstGeom>
+        </p:spPr>
+      </p:pic>
+      <p:pic>
+        <p:nvPicPr>
+          <p:cNvPr id="5" name="Picture 4">
+            <a:extLst>
+              <a:ext uri="{FF2B5EF4-FFF2-40B4-BE49-F238E27FC236}">
+                <a16:creationId xmlns:a16="http://schemas.microsoft.com/office/drawing/2014/main" id="{47926247-FAA6-8C4B-B960-C11A5BC1B228}"/>
+              </a:ext>
+            </a:extLst>
+          </p:cNvPr>
+          <p:cNvPicPr>
+            <a:picLocks noChangeAspect="1"/>
+          </p:cNvPicPr>
+          <p:nvPr/>
+        </p:nvPicPr>
+        <p:blipFill>
+          <a:blip r:embed="rId4"/>
+          <a:stretch>
+            <a:fillRect/>
+          </a:stretch>
+        </p:blipFill>
+        <p:spPr>
+          <a:xfrm>
+            <a:off x="4575811" y="2254532"/>
+            <a:ext cx="2745499" cy="1860268"/>
+          </a:xfrm>
+          <a:prstGeom prst="rect">
+            <a:avLst/>
+          </a:prstGeom>
+        </p:spPr>
+      </p:pic>
+      <mc:AlternateContent xmlns:mc="http://schemas.openxmlformats.org/markup-compatibility/2006" xmlns:a14="http://schemas.microsoft.com/office/drawing/2010/main">
+        <mc:Choice Requires="a14">
+          <p:sp>
+            <p:nvSpPr>
+              <p:cNvPr id="6" name="TextBox 5">
+                <a:extLst>
+                  <a:ext uri="{FF2B5EF4-FFF2-40B4-BE49-F238E27FC236}">
+                    <a16:creationId xmlns:a16="http://schemas.microsoft.com/office/drawing/2014/main" id="{191DB443-7981-CB40-871D-3875693439E0}"/>
+                  </a:ext>
+                </a:extLst>
+              </p:cNvPr>
+              <p:cNvSpPr txBox="1"/>
+              <p:nvPr/>
+            </p:nvSpPr>
+            <p:spPr>
+              <a:xfrm>
+                <a:off x="1985011" y="1905000"/>
+                <a:ext cx="1163780" cy="276999"/>
+              </a:xfrm>
+              <a:prstGeom prst="rect">
+                <a:avLst/>
+              </a:prstGeom>
+              <a:noFill/>
+            </p:spPr>
+            <p:txBody>
+              <a:bodyPr wrap="none" lIns="0" tIns="0" rIns="0" bIns="0" rtlCol="0">
+                <a:spAutoFit/>
+              </a:bodyPr>
+              <a:lstStyle/>
+              <a:p>
+                <a:pPr/>
+                <a14:m>
+                  <m:oMathPara xmlns:m="http://schemas.openxmlformats.org/officeDocument/2006/math">
+                    <m:oMathParaPr>
+                      <m:jc m:val="centerGroup"/>
+                    </m:oMathParaPr>
+                    <m:oMath xmlns:m="http://schemas.openxmlformats.org/officeDocument/2006/math">
+                      <m:r>
+                        <a:rPr lang="en-US" b="0" i="1" smtClean="0">
+                          <a:latin typeface="Cambria Math" panose="02040503050406030204" pitchFamily="18" charset="0"/>
+                        </a:rPr>
+                        <m:t>𝑦</m:t>
+                      </m:r>
+                      <m:r>
+                        <a:rPr lang="en-US" b="0" i="1" smtClean="0">
+                          <a:latin typeface="Cambria Math" panose="02040503050406030204" pitchFamily="18" charset="0"/>
+                        </a:rPr>
+                        <m:t>=</m:t>
+                      </m:r>
+                      <m:r>
+                        <a:rPr lang="en-US" b="0" i="1" smtClean="0">
+                          <a:latin typeface="Cambria Math" panose="02040503050406030204" pitchFamily="18" charset="0"/>
+                        </a:rPr>
+                        <m:t>𝑎𝑥</m:t>
+                      </m:r>
+                      <m:r>
+                        <a:rPr lang="en-US" b="0" i="1" smtClean="0">
+                          <a:latin typeface="Cambria Math" panose="02040503050406030204" pitchFamily="18" charset="0"/>
+                        </a:rPr>
+                        <m:t>+</m:t>
+                      </m:r>
+                      <m:r>
+                        <a:rPr lang="en-US" b="0" i="1" smtClean="0">
+                          <a:latin typeface="Cambria Math" panose="02040503050406030204" pitchFamily="18" charset="0"/>
+                        </a:rPr>
+                        <m:t>𝑏</m:t>
+                      </m:r>
+                    </m:oMath>
+                  </m:oMathPara>
+                </a14:m>
+                <a:endParaRPr lang="en-US" dirty="0"/>
+              </a:p>
+            </p:txBody>
+          </p:sp>
+        </mc:Choice>
+        <mc:Fallback xmlns="">
+          <p:sp>
+            <p:nvSpPr>
+              <p:cNvPr id="6" name="TextBox 5">
+                <a:extLst>
+                  <a:ext uri="{FF2B5EF4-FFF2-40B4-BE49-F238E27FC236}">
+                    <a16:creationId xmlns:a16="http://schemas.microsoft.com/office/drawing/2014/main" id="{191DB443-7981-CB40-871D-3875693439E0}"/>
+                  </a:ext>
+                </a:extLst>
+              </p:cNvPr>
+              <p:cNvSpPr txBox="1">
+                <a:spLocks noRot="1" noChangeAspect="1" noMove="1" noResize="1" noEditPoints="1" noAdjustHandles="1" noChangeArrowheads="1" noChangeShapeType="1" noTextEdit="1"/>
+              </p:cNvSpPr>
+              <p:nvPr/>
+            </p:nvSpPr>
+            <p:spPr>
+              <a:xfrm>
+                <a:off x="1985011" y="1905000"/>
+                <a:ext cx="1163780" cy="276999"/>
+              </a:xfrm>
+              <a:prstGeom prst="rect">
+                <a:avLst/>
+              </a:prstGeom>
+              <a:blipFill>
+                <a:blip r:embed="rId5"/>
+                <a:stretch>
+                  <a:fillRect l="-4348" r="-3261" b="-26087"/>
+                </a:stretch>
+              </a:blipFill>
+            </p:spPr>
+            <p:txBody>
+              <a:bodyPr/>
+              <a:lstStyle/>
+              <a:p>
+                <a:r>
+                  <a:rPr lang="en-US">
+                    <a:noFill/>
+                  </a:rPr>
+                  <a:t> </a:t>
+                </a:r>
+              </a:p>
+            </p:txBody>
+          </p:sp>
+        </mc:Fallback>
+      </mc:AlternateContent>
+      <mc:AlternateContent xmlns:mc="http://schemas.openxmlformats.org/markup-compatibility/2006" xmlns:a14="http://schemas.microsoft.com/office/drawing/2010/main">
+        <mc:Choice Requires="a14">
+          <p:sp>
+            <p:nvSpPr>
+              <p:cNvPr id="7" name="TextBox 6">
+                <a:extLst>
+                  <a:ext uri="{FF2B5EF4-FFF2-40B4-BE49-F238E27FC236}">
+                    <a16:creationId xmlns:a16="http://schemas.microsoft.com/office/drawing/2014/main" id="{4E25F017-BCE8-1249-8C93-20491398FD4F}"/>
+                  </a:ext>
+                </a:extLst>
+              </p:cNvPr>
+              <p:cNvSpPr txBox="1"/>
+              <p:nvPr/>
+            </p:nvSpPr>
+            <p:spPr>
+              <a:xfrm>
+                <a:off x="4806710" y="1880344"/>
+                <a:ext cx="3529876" cy="276999"/>
+              </a:xfrm>
+              <a:prstGeom prst="rect">
+                <a:avLst/>
+              </a:prstGeom>
+              <a:noFill/>
+            </p:spPr>
+            <p:txBody>
+              <a:bodyPr wrap="none" lIns="0" tIns="0" rIns="0" bIns="0" rtlCol="0">
+                <a:spAutoFit/>
+              </a:bodyPr>
+              <a:lstStyle/>
+              <a:p>
+                <a:pPr/>
+                <a14:m>
+                  <m:oMathPara xmlns:m="http://schemas.openxmlformats.org/officeDocument/2006/math">
+                    <m:oMathParaPr>
+                      <m:jc m:val="centerGroup"/>
+                    </m:oMathParaPr>
+                    <m:oMath xmlns:m="http://schemas.openxmlformats.org/officeDocument/2006/math">
+                      <m:r>
+                        <a:rPr lang="en-US" b="0" i="1" smtClean="0">
+                          <a:latin typeface="Cambria Math" panose="02040503050406030204" pitchFamily="18" charset="0"/>
+                        </a:rPr>
+                        <m:t>𝑦</m:t>
+                      </m:r>
+                      <m:r>
+                        <a:rPr lang="en-US" b="0" i="1" smtClean="0">
+                          <a:latin typeface="Cambria Math" panose="02040503050406030204" pitchFamily="18" charset="0"/>
+                        </a:rPr>
+                        <m:t>=</m:t>
+                      </m:r>
+                      <m:sSub>
+                        <m:sSubPr>
+                          <m:ctrlPr>
+                            <a:rPr lang="en-US" b="0" i="1" smtClean="0">
+                              <a:latin typeface="Cambria Math" panose="02040503050406030204" pitchFamily="18" charset="0"/>
+                            </a:rPr>
+                          </m:ctrlPr>
+                        </m:sSubPr>
+                        <m:e>
+                          <m:r>
+                            <a:rPr lang="en-US" b="0" i="1" smtClean="0">
+                              <a:latin typeface="Cambria Math" panose="02040503050406030204" pitchFamily="18" charset="0"/>
+                            </a:rPr>
+                            <m:t>𝑎</m:t>
+                          </m:r>
+                        </m:e>
+                        <m:sub>
+                          <m:r>
+                            <a:rPr lang="en-US" b="0" i="1" smtClean="0">
+                              <a:latin typeface="Cambria Math" panose="02040503050406030204" pitchFamily="18" charset="0"/>
+                            </a:rPr>
+                            <m:t>1</m:t>
+                          </m:r>
+                        </m:sub>
+                      </m:sSub>
+                      <m:r>
+                        <a:rPr lang="en-US" b="0" i="1" smtClean="0">
+                          <a:latin typeface="Cambria Math" panose="02040503050406030204" pitchFamily="18" charset="0"/>
+                        </a:rPr>
+                        <m:t>𝑥</m:t>
+                      </m:r>
+                      <m:r>
+                        <a:rPr lang="en-US" b="0" i="1" smtClean="0">
+                          <a:latin typeface="Cambria Math" panose="02040503050406030204" pitchFamily="18" charset="0"/>
+                        </a:rPr>
+                        <m:t>+</m:t>
+                      </m:r>
+                      <m:sSub>
+                        <m:sSubPr>
+                          <m:ctrlPr>
+                            <a:rPr lang="en-US" b="0" i="1" smtClean="0">
+                              <a:latin typeface="Cambria Math" panose="02040503050406030204" pitchFamily="18" charset="0"/>
+                            </a:rPr>
+                          </m:ctrlPr>
+                        </m:sSubPr>
+                        <m:e>
+                          <m:r>
+                            <a:rPr lang="en-US" b="0" i="1" smtClean="0">
+                              <a:latin typeface="Cambria Math" panose="02040503050406030204" pitchFamily="18" charset="0"/>
+                            </a:rPr>
+                            <m:t>𝑎</m:t>
+                          </m:r>
+                        </m:e>
+                        <m:sub>
+                          <m:r>
+                            <a:rPr lang="en-US" b="0" i="1" smtClean="0">
+                              <a:latin typeface="Cambria Math" panose="02040503050406030204" pitchFamily="18" charset="0"/>
+                            </a:rPr>
+                            <m:t>2</m:t>
+                          </m:r>
+                        </m:sub>
+                      </m:sSub>
+                      <m:sSup>
+                        <m:sSupPr>
+                          <m:ctrlPr>
+                            <a:rPr lang="en-US" b="0" i="1" smtClean="0">
+                              <a:latin typeface="Cambria Math" panose="02040503050406030204" pitchFamily="18" charset="0"/>
+                            </a:rPr>
+                          </m:ctrlPr>
+                        </m:sSupPr>
+                        <m:e>
+                          <m:r>
+                            <a:rPr lang="en-US" b="0" i="1" smtClean="0">
+                              <a:latin typeface="Cambria Math" panose="02040503050406030204" pitchFamily="18" charset="0"/>
+                            </a:rPr>
+                            <m:t>𝑥</m:t>
+                          </m:r>
+                        </m:e>
+                        <m:sup>
+                          <m:r>
+                            <a:rPr lang="en-US" b="0" i="1" smtClean="0">
+                              <a:latin typeface="Cambria Math" panose="02040503050406030204" pitchFamily="18" charset="0"/>
+                            </a:rPr>
+                            <m:t>2</m:t>
+                          </m:r>
+                        </m:sup>
+                      </m:sSup>
+                      <m:r>
+                        <a:rPr lang="en-US" b="0" i="1" smtClean="0">
+                          <a:latin typeface="Cambria Math" panose="02040503050406030204" pitchFamily="18" charset="0"/>
+                        </a:rPr>
+                        <m:t>+</m:t>
+                      </m:r>
+                      <m:sSub>
+                        <m:sSubPr>
+                          <m:ctrlPr>
+                            <a:rPr lang="en-US" b="0" i="1" smtClean="0">
+                              <a:latin typeface="Cambria Math" panose="02040503050406030204" pitchFamily="18" charset="0"/>
+                            </a:rPr>
+                          </m:ctrlPr>
+                        </m:sSubPr>
+                        <m:e>
+                          <m:r>
+                            <a:rPr lang="en-US" b="0" i="1" smtClean="0">
+                              <a:latin typeface="Cambria Math" panose="02040503050406030204" pitchFamily="18" charset="0"/>
+                            </a:rPr>
+                            <m:t>𝑎</m:t>
+                          </m:r>
+                        </m:e>
+                        <m:sub>
+                          <m:r>
+                            <a:rPr lang="en-US" b="0" i="1" smtClean="0">
+                              <a:latin typeface="Cambria Math" panose="02040503050406030204" pitchFamily="18" charset="0"/>
+                            </a:rPr>
+                            <m:t>3</m:t>
+                          </m:r>
+                        </m:sub>
+                      </m:sSub>
+                      <m:sSup>
+                        <m:sSupPr>
+                          <m:ctrlPr>
+                            <a:rPr lang="en-US" b="0" i="1" smtClean="0">
+                              <a:latin typeface="Cambria Math" panose="02040503050406030204" pitchFamily="18" charset="0"/>
+                            </a:rPr>
+                          </m:ctrlPr>
+                        </m:sSupPr>
+                        <m:e>
+                          <m:r>
+                            <a:rPr lang="en-US" b="0" i="1" smtClean="0">
+                              <a:latin typeface="Cambria Math" panose="02040503050406030204" pitchFamily="18" charset="0"/>
+                            </a:rPr>
+                            <m:t>𝑥</m:t>
+                          </m:r>
+                        </m:e>
+                        <m:sup>
+                          <m:r>
+                            <a:rPr lang="en-US" b="0" i="1" smtClean="0">
+                              <a:latin typeface="Cambria Math" panose="02040503050406030204" pitchFamily="18" charset="0"/>
+                            </a:rPr>
+                            <m:t>3</m:t>
+                          </m:r>
+                        </m:sup>
+                      </m:sSup>
+                      <m:r>
+                        <a:rPr lang="en-US" b="0" i="1" smtClean="0">
+                          <a:latin typeface="Cambria Math" panose="02040503050406030204" pitchFamily="18" charset="0"/>
+                        </a:rPr>
+                        <m:t>+</m:t>
+                      </m:r>
+                      <m:sSub>
+                        <m:sSubPr>
+                          <m:ctrlPr>
+                            <a:rPr lang="en-US" b="0" i="1" smtClean="0">
+                              <a:latin typeface="Cambria Math" panose="02040503050406030204" pitchFamily="18" charset="0"/>
+                            </a:rPr>
+                          </m:ctrlPr>
+                        </m:sSubPr>
+                        <m:e>
+                          <m:r>
+                            <a:rPr lang="en-US" b="0" i="1" smtClean="0">
+                              <a:latin typeface="Cambria Math" panose="02040503050406030204" pitchFamily="18" charset="0"/>
+                            </a:rPr>
+                            <m:t>𝑎</m:t>
+                          </m:r>
+                        </m:e>
+                        <m:sub>
+                          <m:r>
+                            <a:rPr lang="en-US" b="0" i="1" smtClean="0">
+                              <a:latin typeface="Cambria Math" panose="02040503050406030204" pitchFamily="18" charset="0"/>
+                            </a:rPr>
+                            <m:t>4</m:t>
+                          </m:r>
+                        </m:sub>
+                      </m:sSub>
+                      <m:sSup>
+                        <m:sSupPr>
+                          <m:ctrlPr>
+                            <a:rPr lang="en-US" b="0" i="1" smtClean="0">
+                              <a:latin typeface="Cambria Math" panose="02040503050406030204" pitchFamily="18" charset="0"/>
+                            </a:rPr>
+                          </m:ctrlPr>
+                        </m:sSupPr>
+                        <m:e>
+                          <m:r>
+                            <a:rPr lang="en-US" b="0" i="1" smtClean="0">
+                              <a:latin typeface="Cambria Math" panose="02040503050406030204" pitchFamily="18" charset="0"/>
+                            </a:rPr>
+                            <m:t>𝑥</m:t>
+                          </m:r>
+                        </m:e>
+                        <m:sup>
+                          <m:r>
+                            <a:rPr lang="en-US" b="0" i="1" smtClean="0">
+                              <a:latin typeface="Cambria Math" panose="02040503050406030204" pitchFamily="18" charset="0"/>
+                            </a:rPr>
+                            <m:t>4</m:t>
+                          </m:r>
+                        </m:sup>
+                      </m:sSup>
+                      <m:r>
+                        <a:rPr lang="en-US" b="0" i="1" smtClean="0">
+                          <a:latin typeface="Cambria Math" panose="02040503050406030204" pitchFamily="18" charset="0"/>
+                        </a:rPr>
+                        <m:t>+</m:t>
+                      </m:r>
+                      <m:r>
+                        <a:rPr lang="en-US" b="0" i="1" smtClean="0">
+                          <a:latin typeface="Cambria Math" panose="02040503050406030204" pitchFamily="18" charset="0"/>
+                        </a:rPr>
+                        <m:t>𝑏</m:t>
+                      </m:r>
+                    </m:oMath>
+                  </m:oMathPara>
+                </a14:m>
+                <a:endParaRPr lang="en-US" dirty="0"/>
+              </a:p>
+            </p:txBody>
+          </p:sp>
+        </mc:Choice>
+        <mc:Fallback xmlns="">
+          <p:sp>
+            <p:nvSpPr>
+              <p:cNvPr id="7" name="TextBox 6">
+                <a:extLst>
+                  <a:ext uri="{FF2B5EF4-FFF2-40B4-BE49-F238E27FC236}">
+                    <a16:creationId xmlns:a16="http://schemas.microsoft.com/office/drawing/2014/main" id="{4E25F017-BCE8-1249-8C93-20491398FD4F}"/>
+                  </a:ext>
+                </a:extLst>
+              </p:cNvPr>
+              <p:cNvSpPr txBox="1">
+                <a:spLocks noRot="1" noChangeAspect="1" noMove="1" noResize="1" noEditPoints="1" noAdjustHandles="1" noChangeArrowheads="1" noChangeShapeType="1" noTextEdit="1"/>
+              </p:cNvSpPr>
+              <p:nvPr/>
+            </p:nvSpPr>
+            <p:spPr>
+              <a:xfrm>
+                <a:off x="4806710" y="1880344"/>
+                <a:ext cx="3529876" cy="276999"/>
+              </a:xfrm>
+              <a:prstGeom prst="rect">
+                <a:avLst/>
+              </a:prstGeom>
+              <a:blipFill>
+                <a:blip r:embed="rId6"/>
+                <a:stretch>
+                  <a:fillRect l="-717" r="-1075" b="-26087"/>
+                </a:stretch>
+              </a:blipFill>
+            </p:spPr>
+            <p:txBody>
+              <a:bodyPr/>
+              <a:lstStyle/>
+              <a:p>
+                <a:r>
+                  <a:rPr lang="en-US">
+                    <a:noFill/>
+                  </a:rPr>
+                  <a:t> </a:t>
+                </a:r>
+              </a:p>
+            </p:txBody>
+          </p:sp>
+        </mc:Fallback>
+      </mc:AlternateContent>
+      <mc:AlternateContent xmlns:mc="http://schemas.openxmlformats.org/markup-compatibility/2006" xmlns:a14="http://schemas.microsoft.com/office/drawing/2010/main">
+        <mc:Choice Requires="a14">
+          <p:sp>
+            <p:nvSpPr>
+              <p:cNvPr id="9" name="Rectangle 8">
+                <a:extLst>
+                  <a:ext uri="{FF2B5EF4-FFF2-40B4-BE49-F238E27FC236}">
+                    <a16:creationId xmlns:a16="http://schemas.microsoft.com/office/drawing/2014/main" id="{D8AD2DC4-9639-A44E-ABDF-3E6CC00A001F}"/>
+                  </a:ext>
+                </a:extLst>
+              </p:cNvPr>
+              <p:cNvSpPr/>
+              <p:nvPr/>
+            </p:nvSpPr>
+            <p:spPr>
+              <a:xfrm>
+                <a:off x="723307" y="891274"/>
+                <a:ext cx="6134693" cy="861326"/>
+              </a:xfrm>
+              <a:prstGeom prst="rect">
+                <a:avLst/>
+              </a:prstGeom>
+            </p:spPr>
+            <p:txBody>
+              <a:bodyPr wrap="none">
+                <a:spAutoFit/>
+              </a:bodyPr>
+              <a:lstStyle/>
+              <a:p>
+                <a:pPr/>
+                <a14:m>
+                  <m:oMathPara xmlns:m="http://schemas.openxmlformats.org/officeDocument/2006/math">
+                    <m:oMathParaPr>
+                      <m:jc m:val="centerGroup"/>
+                    </m:oMathParaPr>
+                    <m:oMath xmlns:m="http://schemas.openxmlformats.org/officeDocument/2006/math">
+                      <m:sSup>
+                        <m:sSupPr>
+                          <m:ctrlPr>
+                            <a:rPr lang="en-US" sz="2400" i="1" smtClean="0">
+                              <a:latin typeface="Cambria Math" panose="02040503050406030204" pitchFamily="18" charset="0"/>
+                            </a:rPr>
+                          </m:ctrlPr>
+                        </m:sSupPr>
+                        <m:e>
+                          <m:r>
+                            <a:rPr lang="en-US" sz="2400" i="1">
+                              <a:latin typeface="Cambria Math" panose="02040503050406030204" pitchFamily="18" charset="0"/>
+                            </a:rPr>
+                            <m:t>𝑅</m:t>
+                          </m:r>
+                        </m:e>
+                        <m:sup>
+                          <m:r>
+                            <a:rPr lang="en-US" sz="2400" i="1">
+                              <a:latin typeface="Cambria Math" panose="02040503050406030204" pitchFamily="18" charset="0"/>
+                            </a:rPr>
+                            <m:t>2</m:t>
+                          </m:r>
+                        </m:sup>
+                      </m:sSup>
+                      <m:r>
+                        <a:rPr lang="en-US" sz="2400" i="1">
+                          <a:latin typeface="Cambria Math" panose="02040503050406030204" pitchFamily="18" charset="0"/>
+                        </a:rPr>
+                        <m:t>=</m:t>
+                      </m:r>
+                      <m:f>
+                        <m:fPr>
+                          <m:ctrlPr>
+                            <a:rPr lang="en-US" sz="2400" i="1">
+                              <a:latin typeface="Cambria Math" panose="02040503050406030204" pitchFamily="18" charset="0"/>
+                            </a:rPr>
+                          </m:ctrlPr>
+                        </m:fPr>
+                        <m:num>
+                          <m:r>
+                            <a:rPr lang="en-US" sz="2400" i="1">
+                              <a:latin typeface="Cambria Math" panose="02040503050406030204" pitchFamily="18" charset="0"/>
+                            </a:rPr>
+                            <m:t>𝑣𝑎𝑟</m:t>
+                          </m:r>
+                          <m:r>
+                            <a:rPr lang="en-US" sz="2400" i="1">
+                              <a:latin typeface="Cambria Math" panose="02040503050406030204" pitchFamily="18" charset="0"/>
+                            </a:rPr>
+                            <m:t>(</m:t>
+                          </m:r>
+                          <m:r>
+                            <a:rPr lang="en-US" sz="2400" b="0" i="1" smtClean="0">
+                              <a:latin typeface="Cambria Math" panose="02040503050406030204" pitchFamily="18" charset="0"/>
+                            </a:rPr>
+                            <m:t>𝑓𝑖𝑡𝑡𝑒𝑑</m:t>
+                          </m:r>
+                          <m:r>
+                            <a:rPr lang="en-US" sz="2400" i="1">
+                              <a:latin typeface="Cambria Math" panose="02040503050406030204" pitchFamily="18" charset="0"/>
+                            </a:rPr>
+                            <m:t>)</m:t>
+                          </m:r>
+                        </m:num>
+                        <m:den>
+                          <m:r>
+                            <a:rPr lang="en-US" sz="2400" i="1">
+                              <a:latin typeface="Cambria Math" panose="02040503050406030204" pitchFamily="18" charset="0"/>
+                            </a:rPr>
+                            <m:t>𝑣𝑎𝑟</m:t>
+                          </m:r>
+                          <m:r>
+                            <a:rPr lang="en-US" sz="2400" i="1">
+                              <a:latin typeface="Cambria Math" panose="02040503050406030204" pitchFamily="18" charset="0"/>
+                            </a:rPr>
+                            <m:t>(</m:t>
+                          </m:r>
+                          <m:r>
+                            <a:rPr lang="en-US" sz="2400" i="1">
+                              <a:latin typeface="Cambria Math" panose="02040503050406030204" pitchFamily="18" charset="0"/>
+                            </a:rPr>
+                            <m:t>𝑜𝑏𝑠𝑒𝑟𝑣𝑒𝑑</m:t>
+                          </m:r>
+                          <m:r>
+                            <a:rPr lang="en-US" sz="2400" i="1">
+                              <a:latin typeface="Cambria Math" panose="02040503050406030204" pitchFamily="18" charset="0"/>
+                            </a:rPr>
+                            <m:t>)</m:t>
+                          </m:r>
+                        </m:den>
+                      </m:f>
+                      <m:r>
+                        <a:rPr lang="en-US" sz="2400" b="0" i="1" smtClean="0">
+                          <a:latin typeface="Cambria Math" panose="02040503050406030204" pitchFamily="18" charset="0"/>
+                        </a:rPr>
+                        <m:t>=1 −</m:t>
+                      </m:r>
+                      <m:f>
+                        <m:fPr>
+                          <m:ctrlPr>
+                            <a:rPr lang="en-US" sz="2400" i="1">
+                              <a:latin typeface="Cambria Math" panose="02040503050406030204" pitchFamily="18" charset="0"/>
+                            </a:rPr>
+                          </m:ctrlPr>
+                        </m:fPr>
+                        <m:num>
+                          <m:r>
+                            <a:rPr lang="en-US" sz="2400" i="1">
+                              <a:latin typeface="Cambria Math" panose="02040503050406030204" pitchFamily="18" charset="0"/>
+                            </a:rPr>
+                            <m:t>𝑣𝑎𝑟</m:t>
+                          </m:r>
+                          <m:r>
+                            <a:rPr lang="en-US" sz="2400" i="1">
+                              <a:latin typeface="Cambria Math" panose="02040503050406030204" pitchFamily="18" charset="0"/>
+                            </a:rPr>
+                            <m:t>(</m:t>
+                          </m:r>
+                          <m:r>
+                            <a:rPr lang="en-US" sz="2400" b="0" i="1" smtClean="0">
+                              <a:latin typeface="Cambria Math" panose="02040503050406030204" pitchFamily="18" charset="0"/>
+                            </a:rPr>
+                            <m:t>𝑟𝑒𝑠𝑖𝑑𝑢𝑎𝑙𝑠</m:t>
+                          </m:r>
+                          <m:r>
+                            <a:rPr lang="en-US" sz="2400" i="1">
+                              <a:latin typeface="Cambria Math" panose="02040503050406030204" pitchFamily="18" charset="0"/>
+                            </a:rPr>
+                            <m:t>)</m:t>
+                          </m:r>
+                        </m:num>
+                        <m:den>
+                          <m:r>
+                            <a:rPr lang="en-US" sz="2400" i="1">
+                              <a:latin typeface="Cambria Math" panose="02040503050406030204" pitchFamily="18" charset="0"/>
+                            </a:rPr>
+                            <m:t>𝑣𝑎𝑟</m:t>
+                          </m:r>
+                          <m:r>
+                            <a:rPr lang="en-US" sz="2400" i="1">
+                              <a:latin typeface="Cambria Math" panose="02040503050406030204" pitchFamily="18" charset="0"/>
+                            </a:rPr>
+                            <m:t>(</m:t>
+                          </m:r>
+                          <m:r>
+                            <a:rPr lang="en-US" sz="2400" i="1">
+                              <a:latin typeface="Cambria Math" panose="02040503050406030204" pitchFamily="18" charset="0"/>
+                            </a:rPr>
+                            <m:t>𝑜𝑏𝑠𝑒𝑟𝑣𝑒𝑑</m:t>
+                          </m:r>
+                          <m:r>
+                            <a:rPr lang="en-US" sz="2400" i="1">
+                              <a:latin typeface="Cambria Math" panose="02040503050406030204" pitchFamily="18" charset="0"/>
+                            </a:rPr>
+                            <m:t>)</m:t>
+                          </m:r>
+                        </m:den>
+                      </m:f>
+                    </m:oMath>
+                  </m:oMathPara>
+                </a14:m>
+                <a:endParaRPr lang="en-US" sz="2400" dirty="0"/>
+              </a:p>
+            </p:txBody>
+          </p:sp>
+        </mc:Choice>
+        <mc:Fallback xmlns="">
+          <p:sp>
+            <p:nvSpPr>
+              <p:cNvPr id="9" name="Rectangle 8">
+                <a:extLst>
+                  <a:ext uri="{FF2B5EF4-FFF2-40B4-BE49-F238E27FC236}">
+                    <a16:creationId xmlns:a16="http://schemas.microsoft.com/office/drawing/2014/main" id="{D8AD2DC4-9639-A44E-ABDF-3E6CC00A001F}"/>
+                  </a:ext>
+                </a:extLst>
+              </p:cNvPr>
+              <p:cNvSpPr>
+                <a:spLocks noRot="1" noChangeAspect="1" noMove="1" noResize="1" noEditPoints="1" noAdjustHandles="1" noChangeArrowheads="1" noChangeShapeType="1" noTextEdit="1"/>
+              </p:cNvSpPr>
+              <p:nvPr/>
+            </p:nvSpPr>
+            <p:spPr>
+              <a:xfrm>
+                <a:off x="723307" y="891274"/>
+                <a:ext cx="6134693" cy="861326"/>
+              </a:xfrm>
+              <a:prstGeom prst="rect">
+                <a:avLst/>
+              </a:prstGeom>
+              <a:blipFill>
+                <a:blip r:embed="rId7"/>
+                <a:stretch>
+                  <a:fillRect b="-8696"/>
+                </a:stretch>
+              </a:blipFill>
+            </p:spPr>
+            <p:txBody>
+              <a:bodyPr/>
+              <a:lstStyle/>
+              <a:p>
+                <a:r>
+                  <a:rPr lang="en-US">
+                    <a:noFill/>
+                  </a:rPr>
+                  <a:t> </a:t>
+                </a:r>
+              </a:p>
+            </p:txBody>
+          </p:sp>
+        </mc:Fallback>
+      </mc:AlternateContent>
+      <p:pic>
+        <p:nvPicPr>
+          <p:cNvPr id="11" name="Picture 10">
+            <a:extLst>
+              <a:ext uri="{FF2B5EF4-FFF2-40B4-BE49-F238E27FC236}">
+                <a16:creationId xmlns:a16="http://schemas.microsoft.com/office/drawing/2014/main" id="{0308C791-94AE-8A40-A302-D19B253E92AB}"/>
+              </a:ext>
+            </a:extLst>
+          </p:cNvPr>
+          <p:cNvPicPr>
+            <a:picLocks noChangeAspect="1"/>
+          </p:cNvPicPr>
+          <p:nvPr/>
+        </p:nvPicPr>
+        <p:blipFill>
+          <a:blip r:embed="rId8"/>
+          <a:stretch>
+            <a:fillRect/>
+          </a:stretch>
+        </p:blipFill>
+        <p:spPr>
+          <a:xfrm>
+            <a:off x="4544575" y="3891459"/>
+            <a:ext cx="2807970" cy="2077766"/>
+          </a:xfrm>
+          <a:prstGeom prst="rect">
+            <a:avLst/>
+          </a:prstGeom>
+        </p:spPr>
+      </p:pic>
+      <p:pic>
+        <p:nvPicPr>
+          <p:cNvPr id="12" name="Picture 11">
+            <a:extLst>
+              <a:ext uri="{FF2B5EF4-FFF2-40B4-BE49-F238E27FC236}">
+                <a16:creationId xmlns:a16="http://schemas.microsoft.com/office/drawing/2014/main" id="{F1EAF5CF-0E7B-6C4E-827A-1B2BAA3F9B81}"/>
+              </a:ext>
+            </a:extLst>
+          </p:cNvPr>
+          <p:cNvPicPr>
+            <a:picLocks noChangeAspect="1"/>
+          </p:cNvPicPr>
+          <p:nvPr/>
+        </p:nvPicPr>
+        <p:blipFill>
+          <a:blip r:embed="rId9"/>
+          <a:stretch>
+            <a:fillRect/>
+          </a:stretch>
+        </p:blipFill>
+        <p:spPr>
+          <a:xfrm>
+            <a:off x="1524000" y="3927902"/>
+            <a:ext cx="2747011" cy="1848220"/>
+          </a:xfrm>
+          <a:prstGeom prst="rect">
+            <a:avLst/>
+          </a:prstGeom>
+        </p:spPr>
+      </p:pic>
+      <p:sp>
+        <p:nvSpPr>
+          <p:cNvPr id="13" name="TextBox 12">
+            <a:extLst>
+              <a:ext uri="{FF2B5EF4-FFF2-40B4-BE49-F238E27FC236}">
+                <a16:creationId xmlns:a16="http://schemas.microsoft.com/office/drawing/2014/main" id="{8F725332-8B67-1B46-94F2-9CA7F06D7093}"/>
+              </a:ext>
+            </a:extLst>
+          </p:cNvPr>
+          <p:cNvSpPr txBox="1"/>
+          <p:nvPr/>
+        </p:nvSpPr>
+        <p:spPr>
+          <a:xfrm>
+            <a:off x="304800" y="2743200"/>
+            <a:ext cx="864339" cy="369332"/>
+          </a:xfrm>
+          <a:prstGeom prst="rect">
+            <a:avLst/>
+          </a:prstGeom>
+          <a:noFill/>
+        </p:spPr>
+        <p:txBody>
+          <a:bodyPr wrap="none" rtlCol="0">
+            <a:spAutoFit/>
+          </a:bodyPr>
+          <a:lstStyle/>
+          <a:p>
+            <a:r>
+              <a:rPr lang="en-US" dirty="0"/>
+              <a:t>Data 1</a:t>
+            </a:r>
+          </a:p>
+        </p:txBody>
+      </p:sp>
+      <p:sp>
+        <p:nvSpPr>
+          <p:cNvPr id="14" name="TextBox 13">
+            <a:extLst>
+              <a:ext uri="{FF2B5EF4-FFF2-40B4-BE49-F238E27FC236}">
+                <a16:creationId xmlns:a16="http://schemas.microsoft.com/office/drawing/2014/main" id="{C099A52B-DBFF-2443-90C6-83AB8DA994B9}"/>
+              </a:ext>
+            </a:extLst>
+          </p:cNvPr>
+          <p:cNvSpPr txBox="1"/>
+          <p:nvPr/>
+        </p:nvSpPr>
+        <p:spPr>
+          <a:xfrm>
+            <a:off x="304800" y="4507468"/>
+            <a:ext cx="864339" cy="369332"/>
+          </a:xfrm>
+          <a:prstGeom prst="rect">
+            <a:avLst/>
+          </a:prstGeom>
+          <a:noFill/>
+        </p:spPr>
+        <p:txBody>
+          <a:bodyPr wrap="none" rtlCol="0">
+            <a:spAutoFit/>
+          </a:bodyPr>
+          <a:lstStyle/>
+          <a:p>
+            <a:r>
+              <a:rPr lang="en-US" dirty="0"/>
+              <a:t>Data 2</a:t>
+            </a:r>
+          </a:p>
+        </p:txBody>
+      </p:sp>
+      <p:sp>
+        <p:nvSpPr>
+          <p:cNvPr id="15" name="TextBox 14">
+            <a:extLst>
+              <a:ext uri="{FF2B5EF4-FFF2-40B4-BE49-F238E27FC236}">
+                <a16:creationId xmlns:a16="http://schemas.microsoft.com/office/drawing/2014/main" id="{2EB17513-4996-A94F-A515-C5FBF8C63838}"/>
+              </a:ext>
+            </a:extLst>
+          </p:cNvPr>
+          <p:cNvSpPr txBox="1"/>
+          <p:nvPr/>
+        </p:nvSpPr>
+        <p:spPr>
+          <a:xfrm>
+            <a:off x="2045447" y="2368034"/>
+            <a:ext cx="633507" cy="369332"/>
+          </a:xfrm>
+          <a:prstGeom prst="rect">
+            <a:avLst/>
+          </a:prstGeom>
+          <a:noFill/>
+        </p:spPr>
+        <p:txBody>
+          <a:bodyPr wrap="none" rtlCol="0">
+            <a:spAutoFit/>
+          </a:bodyPr>
+          <a:lstStyle/>
+          <a:p>
+            <a:r>
+              <a:rPr lang="en-US" dirty="0"/>
+              <a:t>0.85</a:t>
+            </a:r>
+          </a:p>
+        </p:txBody>
+      </p:sp>
+      <p:sp>
+        <p:nvSpPr>
+          <p:cNvPr id="16" name="TextBox 15">
+            <a:extLst>
+              <a:ext uri="{FF2B5EF4-FFF2-40B4-BE49-F238E27FC236}">
+                <a16:creationId xmlns:a16="http://schemas.microsoft.com/office/drawing/2014/main" id="{26E9DBAE-701B-424E-B8F6-7549FC30E75E}"/>
+              </a:ext>
+            </a:extLst>
+          </p:cNvPr>
+          <p:cNvSpPr txBox="1"/>
+          <p:nvPr/>
+        </p:nvSpPr>
+        <p:spPr>
+          <a:xfrm>
+            <a:off x="5055347" y="2368034"/>
+            <a:ext cx="633507" cy="369332"/>
+          </a:xfrm>
+          <a:prstGeom prst="rect">
+            <a:avLst/>
+          </a:prstGeom>
+          <a:noFill/>
+        </p:spPr>
+        <p:txBody>
+          <a:bodyPr wrap="none" rtlCol="0">
+            <a:spAutoFit/>
+          </a:bodyPr>
+          <a:lstStyle/>
+          <a:p>
+            <a:r>
+              <a:rPr lang="en-US" dirty="0"/>
+              <a:t>0.97</a:t>
+            </a:r>
+          </a:p>
+        </p:txBody>
+      </p:sp>
+      <p:sp>
+        <p:nvSpPr>
+          <p:cNvPr id="17" name="TextBox 16">
+            <a:extLst>
+              <a:ext uri="{FF2B5EF4-FFF2-40B4-BE49-F238E27FC236}">
+                <a16:creationId xmlns:a16="http://schemas.microsoft.com/office/drawing/2014/main" id="{5DCC45D4-814E-BB40-9784-CC59CC192CB7}"/>
+              </a:ext>
+            </a:extLst>
+          </p:cNvPr>
+          <p:cNvSpPr txBox="1"/>
+          <p:nvPr/>
+        </p:nvSpPr>
+        <p:spPr>
+          <a:xfrm>
+            <a:off x="2045447" y="4082534"/>
+            <a:ext cx="633507" cy="369332"/>
+          </a:xfrm>
+          <a:prstGeom prst="rect">
+            <a:avLst/>
+          </a:prstGeom>
+          <a:noFill/>
+        </p:spPr>
+        <p:txBody>
+          <a:bodyPr wrap="none" rtlCol="0">
+            <a:spAutoFit/>
+          </a:bodyPr>
+          <a:lstStyle/>
+          <a:p>
+            <a:r>
+              <a:rPr lang="en-US" dirty="0"/>
+              <a:t>0.85</a:t>
+            </a:r>
+          </a:p>
+        </p:txBody>
+      </p:sp>
+      <p:sp>
+        <p:nvSpPr>
+          <p:cNvPr id="18" name="TextBox 17">
+            <a:extLst>
+              <a:ext uri="{FF2B5EF4-FFF2-40B4-BE49-F238E27FC236}">
+                <a16:creationId xmlns:a16="http://schemas.microsoft.com/office/drawing/2014/main" id="{45552AA5-C128-A240-AD3E-F9076B1B792F}"/>
+              </a:ext>
+            </a:extLst>
+          </p:cNvPr>
+          <p:cNvSpPr txBox="1"/>
+          <p:nvPr/>
+        </p:nvSpPr>
+        <p:spPr>
+          <a:xfrm>
+            <a:off x="5055347" y="4082534"/>
+            <a:ext cx="633507" cy="369332"/>
+          </a:xfrm>
+          <a:prstGeom prst="rect">
+            <a:avLst/>
+          </a:prstGeom>
+          <a:noFill/>
+        </p:spPr>
+        <p:txBody>
+          <a:bodyPr wrap="none" rtlCol="0">
+            <a:spAutoFit/>
+          </a:bodyPr>
+          <a:lstStyle/>
+          <a:p>
+            <a:r>
+              <a:rPr lang="en-US" dirty="0"/>
+              <a:t>0.76</a:t>
+            </a:r>
+          </a:p>
+        </p:txBody>
+      </p:sp>
+    </p:spTree>
+    <p:extLst>
+      <p:ext uri="{BB962C8B-B14F-4D97-AF65-F5344CB8AC3E}">
+        <p14:creationId xmlns:p14="http://schemas.microsoft.com/office/powerpoint/2010/main" val="2052200737"/>
+      </p:ext>
+    </p:extLst>
+  </p:cSld>
+  <p:clrMapOvr>
+    <a:masterClrMapping/>
+  </p:clrMapOvr>
+  <p:timing>
+    <p:tnLst>
+      <p:par>
+        <p:cTn id="1" dur="indefinite" restart="never" nodeType="tmRoot">
+          <p:childTnLst>
+            <p:seq concurrent="1" nextAc="seek">
+              <p:cTn id="2" dur="indefinite" nodeType="mainSeq">
+                <p:childTnLst>
+                  <p:par>
+                    <p:cTn id="3" fill="hold">
+                      <p:stCondLst>
+                        <p:cond delay="indefinite"/>
+                      </p:stCondLst>
+                      <p:childTnLst>
+                        <p:par>
+                          <p:cTn id="4" fill="hold">
+                            <p:stCondLst>
+                              <p:cond delay="0"/>
+                            </p:stCondLst>
+                            <p:childTnLst>
+                              <p:par>
+                                <p:cTn id="5" presetID="1" presetClass="entr" presetSubtype="0" fill="hold" nodeType="clickEffect">
+                                  <p:stCondLst>
+                                    <p:cond delay="0"/>
+                                  </p:stCondLst>
+                                  <p:childTnLst>
+                                    <p:set>
+                                      <p:cBhvr>
+                                        <p:cTn id="6" dur="1" fill="hold">
+                                          <p:stCondLst>
+                                            <p:cond delay="0"/>
+                                          </p:stCondLst>
+                                        </p:cTn>
+                                        <p:tgtEl>
+                                          <p:spTgt spid="12"/>
+                                        </p:tgtEl>
+                                        <p:attrNameLst>
+                                          <p:attrName>style.visibility</p:attrName>
+                                        </p:attrNameLst>
+                                      </p:cBhvr>
+                                      <p:to>
+                                        <p:strVal val="visible"/>
+                                      </p:to>
+                                    </p:set>
+                                  </p:childTnLst>
+                                </p:cTn>
+                              </p:par>
+                              <p:par>
+                                <p:cTn id="7" presetID="1" presetClass="entr" presetSubtype="0" fill="hold" nodeType="withEffect">
+                                  <p:stCondLst>
+                                    <p:cond delay="0"/>
+                                  </p:stCondLst>
+                                  <p:childTnLst>
+                                    <p:set>
+                                      <p:cBhvr>
+                                        <p:cTn id="8" dur="1" fill="hold">
+                                          <p:stCondLst>
+                                            <p:cond delay="0"/>
+                                          </p:stCondLst>
+                                        </p:cTn>
+                                        <p:tgtEl>
+                                          <p:spTgt spid="11"/>
+                                        </p:tgtEl>
+                                        <p:attrNameLst>
+                                          <p:attrName>style.visibility</p:attrName>
+                                        </p:attrNameLst>
+                                      </p:cBhvr>
+                                      <p:to>
+                                        <p:strVal val="visible"/>
+                                      </p:to>
+                                    </p:set>
+                                  </p:childTnLst>
+                                </p:cTn>
+                              </p:par>
+                            </p:childTnLst>
+                          </p:cTn>
+                        </p:par>
+                      </p:childTnLst>
+                    </p:cTn>
+                  </p:par>
+                  <p:par>
+                    <p:cTn id="9" fill="hold">
+                      <p:stCondLst>
+                        <p:cond delay="indefinite"/>
+                      </p:stCondLst>
+                      <p:childTnLst>
+                        <p:par>
+                          <p:cTn id="10" fill="hold">
+                            <p:stCondLst>
+                              <p:cond delay="0"/>
+                            </p:stCondLst>
+                            <p:childTnLst>
+                              <p:par>
+                                <p:cTn id="11" presetID="1" presetClass="entr" presetSubtype="0" fill="hold" grpId="0" nodeType="clickEffect">
+                                  <p:stCondLst>
+                                    <p:cond delay="0"/>
+                                  </p:stCondLst>
+                                  <p:childTnLst>
+                                    <p:set>
+                                      <p:cBhvr>
+                                        <p:cTn id="12" dur="1" fill="hold">
+                                          <p:stCondLst>
+                                            <p:cond delay="0"/>
+                                          </p:stCondLst>
+                                        </p:cTn>
+                                        <p:tgtEl>
+                                          <p:spTgt spid="15"/>
+                                        </p:tgtEl>
+                                        <p:attrNameLst>
+                                          <p:attrName>style.visibility</p:attrName>
+                                        </p:attrNameLst>
+                                      </p:cBhvr>
+                                      <p:to>
+                                        <p:strVal val="visible"/>
+                                      </p:to>
+                                    </p:set>
+                                  </p:childTnLst>
+                                </p:cTn>
+                              </p:par>
+                              <p:par>
+                                <p:cTn id="13" presetID="1" presetClass="entr" presetSubtype="0" fill="hold" grpId="0" nodeType="withEffect">
+                                  <p:stCondLst>
+                                    <p:cond delay="0"/>
+                                  </p:stCondLst>
+                                  <p:childTnLst>
+                                    <p:set>
+                                      <p:cBhvr>
+                                        <p:cTn id="14" dur="1" fill="hold">
+                                          <p:stCondLst>
+                                            <p:cond delay="0"/>
+                                          </p:stCondLst>
+                                        </p:cTn>
+                                        <p:tgtEl>
+                                          <p:spTgt spid="17"/>
+                                        </p:tgtEl>
+                                        <p:attrNameLst>
+                                          <p:attrName>style.visibility</p:attrName>
+                                        </p:attrNameLst>
+                                      </p:cBhvr>
+                                      <p:to>
+                                        <p:strVal val="visible"/>
+                                      </p:to>
+                                    </p:set>
+                                  </p:childTnLst>
+                                </p:cTn>
+                              </p:par>
+                            </p:childTnLst>
+                          </p:cTn>
+                        </p:par>
+                      </p:childTnLst>
+                    </p:cTn>
+                  </p:par>
+                  <p:par>
+                    <p:cTn id="15" fill="hold">
+                      <p:stCondLst>
+                        <p:cond delay="indefinite"/>
+                      </p:stCondLst>
+                      <p:childTnLst>
+                        <p:par>
+                          <p:cTn id="16" fill="hold">
+                            <p:stCondLst>
+                              <p:cond delay="0"/>
+                            </p:stCondLst>
+                            <p:childTnLst>
+                              <p:par>
+                                <p:cTn id="17" presetID="1" presetClass="entr" presetSubtype="0" fill="hold" grpId="0" nodeType="clickEffect">
+                                  <p:stCondLst>
+                                    <p:cond delay="0"/>
+                                  </p:stCondLst>
+                                  <p:childTnLst>
+                                    <p:set>
+                                      <p:cBhvr>
+                                        <p:cTn id="18" dur="1" fill="hold">
+                                          <p:stCondLst>
+                                            <p:cond delay="0"/>
+                                          </p:stCondLst>
+                                        </p:cTn>
+                                        <p:tgtEl>
+                                          <p:spTgt spid="16"/>
+                                        </p:tgtEl>
+                                        <p:attrNameLst>
+                                          <p:attrName>style.visibility</p:attrName>
+                                        </p:attrNameLst>
+                                      </p:cBhvr>
+                                      <p:to>
+                                        <p:strVal val="visible"/>
+                                      </p:to>
+                                    </p:set>
+                                  </p:childTnLst>
+                                </p:cTn>
+                              </p:par>
+                              <p:par>
+                                <p:cTn id="19" presetID="1" presetClass="entr" presetSubtype="0" fill="hold" grpId="0" nodeType="withEffect">
+                                  <p:stCondLst>
+                                    <p:cond delay="0"/>
+                                  </p:stCondLst>
+                                  <p:childTnLst>
+                                    <p:set>
+                                      <p:cBhvr>
+                                        <p:cTn id="20" dur="1" fill="hold">
+                                          <p:stCondLst>
+                                            <p:cond delay="0"/>
+                                          </p:stCondLst>
+                                        </p:cTn>
+                                        <p:tgtEl>
+                                          <p:spTgt spid="18"/>
+                                        </p:tgtEl>
+                                        <p:attrNameLst>
+                                          <p:attrName>style.visibility</p:attrName>
+                                        </p:attrNameLst>
+                                      </p:cBhvr>
+                                      <p:to>
+                                        <p:strVal val="visible"/>
+                                      </p:to>
+                                    </p:set>
+                                  </p:childTnLst>
+                                </p:cTn>
+                              </p:par>
+                            </p:childTnLst>
+                          </p:cTn>
+                        </p:par>
+                      </p:childTnLst>
+                    </p:cTn>
+                  </p:par>
+                </p:childTnLst>
+              </p:cTn>
+              <p:prevCondLst>
+                <p:cond evt="onPrev" delay="0">
+                  <p:tgtEl>
+                    <p:sldTgt/>
+                  </p:tgtEl>
+                </p:cond>
+              </p:prevCondLst>
+              <p:nextCondLst>
+                <p:cond evt="onNext" delay="0">
+                  <p:tgtEl>
+                    <p:sldTgt/>
+                  </p:tgtEl>
+                </p:cond>
+              </p:nextCondLst>
+            </p:seq>
+          </p:childTnLst>
+        </p:cTn>
+      </p:par>
+    </p:tnLst>
+    <p:bldLst>
+      <p:bldP spid="15" grpId="0"/>
+      <p:bldP spid="16" grpId="0"/>
+      <p:bldP spid="17" grpId="0"/>
+      <p:bldP spid="18" grpId="0"/>
+    </p:bldLst>
   </p:timing>
 </p:sld>
 </file>

</xml_diff>